<commit_message>
Removed grammar spelling checks.
</commit_message>
<xml_diff>
--- a/Coursework - presentation.pptx
+++ b/Coursework - presentation.pptx
@@ -105,6 +105,11 @@
       </a:defRPr>
     </a:lvl9pPr>
   </p:defaultTextStyle>
+  <p:extLst>
+    <p:ext uri="{EFAFB233-063F-42B5-8137-9DF3F51BA10A}">
+      <p15:sldGuideLst xmlns:p15="http://schemas.microsoft.com/office/powerpoint/2012/main"/>
+    </p:ext>
+  </p:extLst>
 </p:presentation>
 </file>
 

</xml_diff>

<commit_message>
Presentation - first part
</commit_message>
<xml_diff>
--- a/Coursework - presentation.pptx
+++ b/Coursework - presentation.pptx
@@ -7,6 +7,25 @@
   <p:sldIdLst>
     <p:sldId id="256" r:id="rId2"/>
     <p:sldId id="257" r:id="rId3"/>
+    <p:sldId id="258" r:id="rId4"/>
+    <p:sldId id="259" r:id="rId5"/>
+    <p:sldId id="260" r:id="rId6"/>
+    <p:sldId id="261" r:id="rId7"/>
+    <p:sldId id="262" r:id="rId8"/>
+    <p:sldId id="263" r:id="rId9"/>
+    <p:sldId id="264" r:id="rId10"/>
+    <p:sldId id="265" r:id="rId11"/>
+    <p:sldId id="266" r:id="rId12"/>
+    <p:sldId id="267" r:id="rId13"/>
+    <p:sldId id="268" r:id="rId14"/>
+    <p:sldId id="269" r:id="rId15"/>
+    <p:sldId id="270" r:id="rId16"/>
+    <p:sldId id="271" r:id="rId17"/>
+    <p:sldId id="272" r:id="rId18"/>
+    <p:sldId id="273" r:id="rId19"/>
+    <p:sldId id="274" r:id="rId20"/>
+    <p:sldId id="275" r:id="rId21"/>
+    <p:sldId id="276" r:id="rId22"/>
   </p:sldIdLst>
   <p:sldSz cx="12192000" cy="6858000"/>
   <p:notesSz cx="6858000" cy="9144000"/>
@@ -5793,8 +5812,8 @@
         </p:nvSpPr>
         <p:spPr>
           <a:xfrm>
-            <a:off x="1507067" y="2404534"/>
-            <a:ext cx="7766936" cy="2688166"/>
+            <a:off x="876300" y="1816100"/>
+            <a:ext cx="8473903" cy="3848100"/>
           </a:xfrm>
         </p:spPr>
         <p:txBody>
@@ -5802,17 +5821,25 @@
           <a:lstStyle/>
           <a:p>
             <a:r>
-              <a:rPr lang="bg-BG" dirty="0"/>
-              <a:t>Agile методологии за разработка на софтуерни решения</a:t>
-            </a:r>
-            <a:r>
-              <a:rPr lang="en-US" dirty="0"/>
+              <a:rPr lang="bg-BG" sz="6600" dirty="0"/>
+              <a:t>Agile методологии за разработка на </a:t>
+            </a:r>
+            <a:r>
+              <a:rPr lang="bg-BG" sz="6600" dirty="0" smtClean="0"/>
+              <a:t>софтуерни </a:t>
+            </a:r>
+            <a:r>
+              <a:rPr lang="bg-BG" sz="6600" dirty="0"/>
+              <a:t>решения</a:t>
+            </a:r>
+            <a:r>
+              <a:rPr lang="en-US" sz="6600" dirty="0"/>
               <a:t/>
             </a:r>
             <a:br>
-              <a:rPr lang="en-US" dirty="0"/>
+              <a:rPr lang="en-US" sz="6600" dirty="0"/>
             </a:br>
-            <a:endParaRPr lang="en-US" dirty="0"/>
+            <a:endParaRPr lang="en-US" sz="6600" dirty="0"/>
           </a:p>
         </p:txBody>
       </p:sp>
@@ -5820,6 +5847,1235 @@
     <p:extLst>
       <p:ext uri="{BB962C8B-B14F-4D97-AF65-F5344CB8AC3E}">
         <p14:creationId xmlns:p14="http://schemas.microsoft.com/office/powerpoint/2010/main" val="4223211178"/>
+      </p:ext>
+    </p:extLst>
+  </p:cSld>
+  <p:clrMapOvr>
+    <a:masterClrMapping/>
+  </p:clrMapOvr>
+  <p:timing>
+    <p:tnLst>
+      <p:par>
+        <p:cTn id="1" dur="indefinite" restart="never" nodeType="tmRoot"/>
+      </p:par>
+    </p:tnLst>
+  </p:timing>
+</p:sld>
+</file>
+
+<file path=ppt/slides/slide10.xml><?xml version="1.0" encoding="utf-8"?>
+<p:sld xmlns:a="http://schemas.openxmlformats.org/drawingml/2006/main" xmlns:r="http://schemas.openxmlformats.org/officeDocument/2006/relationships" xmlns:p="http://schemas.openxmlformats.org/presentationml/2006/main">
+  <p:cSld>
+    <p:spTree>
+      <p:nvGrpSpPr>
+        <p:cNvPr id="1" name=""/>
+        <p:cNvGrpSpPr/>
+        <p:nvPr/>
+      </p:nvGrpSpPr>
+      <p:grpSpPr>
+        <a:xfrm>
+          <a:off x="0" y="0"/>
+          <a:ext cx="0" cy="0"/>
+          <a:chOff x="0" y="0"/>
+          <a:chExt cx="0" cy="0"/>
+        </a:xfrm>
+      </p:grpSpPr>
+      <p:sp>
+        <p:nvSpPr>
+          <p:cNvPr id="2" name="Title 1"/>
+          <p:cNvSpPr>
+            <a:spLocks noGrp="1"/>
+          </p:cNvSpPr>
+          <p:nvPr>
+            <p:ph type="title"/>
+          </p:nvPr>
+        </p:nvSpPr>
+        <p:spPr/>
+        <p:txBody>
+          <a:bodyPr>
+            <a:normAutofit/>
+          </a:bodyPr>
+          <a:lstStyle/>
+          <a:p>
+            <a:r>
+              <a:rPr lang="en-US" sz="4000" dirty="0"/>
+              <a:t>The Agile </a:t>
+            </a:r>
+            <a:r>
+              <a:rPr lang="en-US" sz="4000" dirty="0" smtClean="0"/>
+              <a:t>Manifesto</a:t>
+            </a:r>
+            <a:endParaRPr lang="en-US" sz="4000" dirty="0"/>
+          </a:p>
+        </p:txBody>
+      </p:sp>
+      <p:sp>
+        <p:nvSpPr>
+          <p:cNvPr id="3" name="Content Placeholder 2"/>
+          <p:cNvSpPr>
+            <a:spLocks noGrp="1"/>
+          </p:cNvSpPr>
+          <p:nvPr>
+            <p:ph sz="half" idx="1"/>
+          </p:nvPr>
+        </p:nvSpPr>
+        <p:spPr>
+          <a:xfrm>
+            <a:off x="677334" y="1600200"/>
+            <a:ext cx="5431366" cy="4441161"/>
+          </a:xfrm>
+        </p:spPr>
+        <p:txBody>
+          <a:bodyPr>
+            <a:normAutofit/>
+          </a:bodyPr>
+          <a:lstStyle/>
+          <a:p>
+            <a:r>
+              <a:rPr lang="bg-BG" sz="3600" dirty="0"/>
+              <a:t>Нашият най-висок приоритет е да задоволим нуждите на клиента чрез ранно и постоянно доставяне на стойностен софтуер.</a:t>
+            </a:r>
+            <a:endParaRPr lang="en-US" sz="3600" dirty="0"/>
+          </a:p>
+          <a:p>
+            <a:endParaRPr lang="en-US" dirty="0"/>
+          </a:p>
+        </p:txBody>
+      </p:sp>
+      <p:pic>
+        <p:nvPicPr>
+          <p:cNvPr id="7" name="Content Placeholder 6"/>
+          <p:cNvPicPr>
+            <a:picLocks noGrp="1" noChangeAspect="1"/>
+          </p:cNvPicPr>
+          <p:nvPr>
+            <p:ph sz="half" idx="2"/>
+          </p:nvPr>
+        </p:nvPicPr>
+        <p:blipFill>
+          <a:blip r:embed="rId2"/>
+          <a:stretch>
+            <a:fillRect/>
+          </a:stretch>
+        </p:blipFill>
+        <p:spPr>
+          <a:xfrm>
+            <a:off x="6337300" y="2775221"/>
+            <a:ext cx="2936875" cy="1855245"/>
+          </a:xfrm>
+          <a:prstGeom prst="rect">
+            <a:avLst/>
+          </a:prstGeom>
+        </p:spPr>
+      </p:pic>
+    </p:spTree>
+    <p:extLst>
+      <p:ext uri="{BB962C8B-B14F-4D97-AF65-F5344CB8AC3E}">
+        <p14:creationId xmlns:p14="http://schemas.microsoft.com/office/powerpoint/2010/main" val="1469474210"/>
+      </p:ext>
+    </p:extLst>
+  </p:cSld>
+  <p:clrMapOvr>
+    <a:masterClrMapping/>
+  </p:clrMapOvr>
+  <p:timing>
+    <p:tnLst>
+      <p:par>
+        <p:cTn id="1" dur="indefinite" restart="never" nodeType="tmRoot"/>
+      </p:par>
+    </p:tnLst>
+  </p:timing>
+</p:sld>
+</file>
+
+<file path=ppt/slides/slide11.xml><?xml version="1.0" encoding="utf-8"?>
+<p:sld xmlns:a="http://schemas.openxmlformats.org/drawingml/2006/main" xmlns:r="http://schemas.openxmlformats.org/officeDocument/2006/relationships" xmlns:p="http://schemas.openxmlformats.org/presentationml/2006/main">
+  <p:cSld>
+    <p:spTree>
+      <p:nvGrpSpPr>
+        <p:cNvPr id="1" name=""/>
+        <p:cNvGrpSpPr/>
+        <p:nvPr/>
+      </p:nvGrpSpPr>
+      <p:grpSpPr>
+        <a:xfrm>
+          <a:off x="0" y="0"/>
+          <a:ext cx="0" cy="0"/>
+          <a:chOff x="0" y="0"/>
+          <a:chExt cx="0" cy="0"/>
+        </a:xfrm>
+      </p:grpSpPr>
+      <p:sp>
+        <p:nvSpPr>
+          <p:cNvPr id="2" name="Title 1"/>
+          <p:cNvSpPr>
+            <a:spLocks noGrp="1"/>
+          </p:cNvSpPr>
+          <p:nvPr>
+            <p:ph type="title"/>
+          </p:nvPr>
+        </p:nvSpPr>
+        <p:spPr/>
+        <p:txBody>
+          <a:bodyPr>
+            <a:normAutofit/>
+          </a:bodyPr>
+          <a:lstStyle/>
+          <a:p>
+            <a:r>
+              <a:rPr lang="en-US" sz="4000" dirty="0"/>
+              <a:t>The Agile </a:t>
+            </a:r>
+            <a:r>
+              <a:rPr lang="en-US" sz="4000" dirty="0" smtClean="0"/>
+              <a:t>Manifesto</a:t>
+            </a:r>
+            <a:endParaRPr lang="en-US" sz="4000" dirty="0"/>
+          </a:p>
+        </p:txBody>
+      </p:sp>
+      <p:sp>
+        <p:nvSpPr>
+          <p:cNvPr id="3" name="Content Placeholder 2"/>
+          <p:cNvSpPr>
+            <a:spLocks noGrp="1"/>
+          </p:cNvSpPr>
+          <p:nvPr>
+            <p:ph sz="half" idx="1"/>
+          </p:nvPr>
+        </p:nvSpPr>
+        <p:spPr>
+          <a:xfrm>
+            <a:off x="677334" y="1600200"/>
+            <a:ext cx="5837766" cy="4441161"/>
+          </a:xfrm>
+        </p:spPr>
+        <p:txBody>
+          <a:bodyPr>
+            <a:normAutofit fontScale="92500" lnSpcReduction="10000"/>
+          </a:bodyPr>
+          <a:lstStyle/>
+          <a:p>
+            <a:pPr lvl="0"/>
+            <a:r>
+              <a:rPr lang="bg-BG" sz="3600" dirty="0"/>
+              <a:t>Приветстваме променящите се изисквания, даже и в напреднал стадий на  разработка. Agile процесите </a:t>
+            </a:r>
+            <a:r>
+              <a:rPr lang="bg-BG" sz="3600" dirty="0" smtClean="0"/>
+              <a:t>приемат промяната </a:t>
+            </a:r>
+            <a:r>
+              <a:rPr lang="bg-BG" sz="3600" dirty="0"/>
+              <a:t>в името на конкурентното предимство на клиента.</a:t>
+            </a:r>
+            <a:endParaRPr lang="en-US" sz="3600" dirty="0"/>
+          </a:p>
+        </p:txBody>
+      </p:sp>
+      <p:pic>
+        <p:nvPicPr>
+          <p:cNvPr id="6" name="Picture 5"/>
+          <p:cNvPicPr>
+            <a:picLocks noChangeAspect="1"/>
+          </p:cNvPicPr>
+          <p:nvPr/>
+        </p:nvPicPr>
+        <p:blipFill>
+          <a:blip r:embed="rId2"/>
+          <a:stretch>
+            <a:fillRect/>
+          </a:stretch>
+        </p:blipFill>
+        <p:spPr>
+          <a:xfrm>
+            <a:off x="6702424" y="1820530"/>
+            <a:ext cx="2085976" cy="3723354"/>
+          </a:xfrm>
+          <a:prstGeom prst="rect">
+            <a:avLst/>
+          </a:prstGeom>
+        </p:spPr>
+      </p:pic>
+    </p:spTree>
+    <p:extLst>
+      <p:ext uri="{BB962C8B-B14F-4D97-AF65-F5344CB8AC3E}">
+        <p14:creationId xmlns:p14="http://schemas.microsoft.com/office/powerpoint/2010/main" val="4185260666"/>
+      </p:ext>
+    </p:extLst>
+  </p:cSld>
+  <p:clrMapOvr>
+    <a:masterClrMapping/>
+  </p:clrMapOvr>
+  <p:timing>
+    <p:tnLst>
+      <p:par>
+        <p:cTn id="1" dur="indefinite" restart="never" nodeType="tmRoot"/>
+      </p:par>
+    </p:tnLst>
+  </p:timing>
+</p:sld>
+</file>
+
+<file path=ppt/slides/slide12.xml><?xml version="1.0" encoding="utf-8"?>
+<p:sld xmlns:a="http://schemas.openxmlformats.org/drawingml/2006/main" xmlns:r="http://schemas.openxmlformats.org/officeDocument/2006/relationships" xmlns:p="http://schemas.openxmlformats.org/presentationml/2006/main">
+  <p:cSld>
+    <p:spTree>
+      <p:nvGrpSpPr>
+        <p:cNvPr id="1" name=""/>
+        <p:cNvGrpSpPr/>
+        <p:nvPr/>
+      </p:nvGrpSpPr>
+      <p:grpSpPr>
+        <a:xfrm>
+          <a:off x="0" y="0"/>
+          <a:ext cx="0" cy="0"/>
+          <a:chOff x="0" y="0"/>
+          <a:chExt cx="0" cy="0"/>
+        </a:xfrm>
+      </p:grpSpPr>
+      <p:sp>
+        <p:nvSpPr>
+          <p:cNvPr id="2" name="Title 1"/>
+          <p:cNvSpPr>
+            <a:spLocks noGrp="1"/>
+          </p:cNvSpPr>
+          <p:nvPr>
+            <p:ph type="title"/>
+          </p:nvPr>
+        </p:nvSpPr>
+        <p:spPr/>
+        <p:txBody>
+          <a:bodyPr>
+            <a:normAutofit/>
+          </a:bodyPr>
+          <a:lstStyle/>
+          <a:p>
+            <a:r>
+              <a:rPr lang="en-US" sz="4000" dirty="0"/>
+              <a:t>The Agile </a:t>
+            </a:r>
+            <a:r>
+              <a:rPr lang="en-US" sz="4000" dirty="0" smtClean="0"/>
+              <a:t>Manifesto</a:t>
+            </a:r>
+            <a:endParaRPr lang="en-US" sz="4000" dirty="0"/>
+          </a:p>
+        </p:txBody>
+      </p:sp>
+      <p:sp>
+        <p:nvSpPr>
+          <p:cNvPr id="3" name="Content Placeholder 2"/>
+          <p:cNvSpPr>
+            <a:spLocks noGrp="1"/>
+          </p:cNvSpPr>
+          <p:nvPr>
+            <p:ph sz="half" idx="1"/>
+          </p:nvPr>
+        </p:nvSpPr>
+        <p:spPr>
+          <a:xfrm>
+            <a:off x="677334" y="1600200"/>
+            <a:ext cx="9139766" cy="4441161"/>
+          </a:xfrm>
+        </p:spPr>
+        <p:txBody>
+          <a:bodyPr>
+            <a:normAutofit/>
+          </a:bodyPr>
+          <a:lstStyle/>
+          <a:p>
+            <a:pPr lvl="0"/>
+            <a:r>
+              <a:rPr lang="bg-BG" sz="3600" dirty="0"/>
+              <a:t>Често доставяне на работещ софтуер - между две седмици и два месеца - с предпочитание към по-кратките срокове.</a:t>
+            </a:r>
+            <a:endParaRPr lang="en-US" sz="3600" dirty="0"/>
+          </a:p>
+        </p:txBody>
+      </p:sp>
+      <p:pic>
+        <p:nvPicPr>
+          <p:cNvPr id="4" name="Picture 3"/>
+          <p:cNvPicPr>
+            <a:picLocks noChangeAspect="1"/>
+          </p:cNvPicPr>
+          <p:nvPr/>
+        </p:nvPicPr>
+        <p:blipFill>
+          <a:blip r:embed="rId2"/>
+          <a:stretch>
+            <a:fillRect/>
+          </a:stretch>
+        </p:blipFill>
+        <p:spPr>
+          <a:xfrm>
+            <a:off x="1433512" y="4203700"/>
+            <a:ext cx="6353175" cy="2057400"/>
+          </a:xfrm>
+          <a:prstGeom prst="rect">
+            <a:avLst/>
+          </a:prstGeom>
+        </p:spPr>
+      </p:pic>
+    </p:spTree>
+    <p:extLst>
+      <p:ext uri="{BB962C8B-B14F-4D97-AF65-F5344CB8AC3E}">
+        <p14:creationId xmlns:p14="http://schemas.microsoft.com/office/powerpoint/2010/main" val="2317536940"/>
+      </p:ext>
+    </p:extLst>
+  </p:cSld>
+  <p:clrMapOvr>
+    <a:masterClrMapping/>
+  </p:clrMapOvr>
+  <p:timing>
+    <p:tnLst>
+      <p:par>
+        <p:cTn id="1" dur="indefinite" restart="never" nodeType="tmRoot"/>
+      </p:par>
+    </p:tnLst>
+  </p:timing>
+</p:sld>
+</file>
+
+<file path=ppt/slides/slide13.xml><?xml version="1.0" encoding="utf-8"?>
+<p:sld xmlns:a="http://schemas.openxmlformats.org/drawingml/2006/main" xmlns:r="http://schemas.openxmlformats.org/officeDocument/2006/relationships" xmlns:p="http://schemas.openxmlformats.org/presentationml/2006/main">
+  <p:cSld>
+    <p:spTree>
+      <p:nvGrpSpPr>
+        <p:cNvPr id="1" name=""/>
+        <p:cNvGrpSpPr/>
+        <p:nvPr/>
+      </p:nvGrpSpPr>
+      <p:grpSpPr>
+        <a:xfrm>
+          <a:off x="0" y="0"/>
+          <a:ext cx="0" cy="0"/>
+          <a:chOff x="0" y="0"/>
+          <a:chExt cx="0" cy="0"/>
+        </a:xfrm>
+      </p:grpSpPr>
+      <p:sp>
+        <p:nvSpPr>
+          <p:cNvPr id="2" name="Title 1"/>
+          <p:cNvSpPr>
+            <a:spLocks noGrp="1"/>
+          </p:cNvSpPr>
+          <p:nvPr>
+            <p:ph type="title"/>
+          </p:nvPr>
+        </p:nvSpPr>
+        <p:spPr/>
+        <p:txBody>
+          <a:bodyPr>
+            <a:normAutofit/>
+          </a:bodyPr>
+          <a:lstStyle/>
+          <a:p>
+            <a:r>
+              <a:rPr lang="en-US" sz="4000" dirty="0"/>
+              <a:t>The Agile </a:t>
+            </a:r>
+            <a:r>
+              <a:rPr lang="en-US" sz="4000" dirty="0" smtClean="0"/>
+              <a:t>Manifesto</a:t>
+            </a:r>
+            <a:endParaRPr lang="en-US" sz="4000" dirty="0"/>
+          </a:p>
+        </p:txBody>
+      </p:sp>
+      <p:sp>
+        <p:nvSpPr>
+          <p:cNvPr id="3" name="Content Placeholder 2"/>
+          <p:cNvSpPr>
+            <a:spLocks noGrp="1"/>
+          </p:cNvSpPr>
+          <p:nvPr>
+            <p:ph sz="half" idx="1"/>
+          </p:nvPr>
+        </p:nvSpPr>
+        <p:spPr>
+          <a:xfrm>
+            <a:off x="677334" y="1600200"/>
+            <a:ext cx="5837766" cy="4441161"/>
+          </a:xfrm>
+        </p:spPr>
+        <p:txBody>
+          <a:bodyPr>
+            <a:normAutofit/>
+          </a:bodyPr>
+          <a:lstStyle/>
+          <a:p>
+            <a:pPr lvl="0"/>
+            <a:r>
+              <a:rPr lang="bg-BG" sz="3600" dirty="0"/>
+              <a:t>Хората на бизнеса и разработчиците трябва да работят заедно ежедневно</a:t>
+            </a:r>
+            <a:br>
+              <a:rPr lang="bg-BG" sz="3600" dirty="0"/>
+            </a:br>
+            <a:r>
+              <a:rPr lang="bg-BG" sz="3600" dirty="0"/>
+              <a:t>през цялото време на проекта.</a:t>
+            </a:r>
+            <a:endParaRPr lang="en-US" sz="3600" dirty="0"/>
+          </a:p>
+        </p:txBody>
+      </p:sp>
+      <p:pic>
+        <p:nvPicPr>
+          <p:cNvPr id="4" name="Picture 3"/>
+          <p:cNvPicPr>
+            <a:picLocks noChangeAspect="1"/>
+          </p:cNvPicPr>
+          <p:nvPr/>
+        </p:nvPicPr>
+        <p:blipFill>
+          <a:blip r:embed="rId2"/>
+          <a:stretch>
+            <a:fillRect/>
+          </a:stretch>
+        </p:blipFill>
+        <p:spPr>
+          <a:xfrm>
+            <a:off x="6307138" y="1600200"/>
+            <a:ext cx="3151569" cy="3530600"/>
+          </a:xfrm>
+          <a:prstGeom prst="rect">
+            <a:avLst/>
+          </a:prstGeom>
+        </p:spPr>
+      </p:pic>
+    </p:spTree>
+    <p:extLst>
+      <p:ext uri="{BB962C8B-B14F-4D97-AF65-F5344CB8AC3E}">
+        <p14:creationId xmlns:p14="http://schemas.microsoft.com/office/powerpoint/2010/main" val="758316820"/>
+      </p:ext>
+    </p:extLst>
+  </p:cSld>
+  <p:clrMapOvr>
+    <a:masterClrMapping/>
+  </p:clrMapOvr>
+  <p:timing>
+    <p:tnLst>
+      <p:par>
+        <p:cTn id="1" dur="indefinite" restart="never" nodeType="tmRoot"/>
+      </p:par>
+    </p:tnLst>
+  </p:timing>
+</p:sld>
+</file>
+
+<file path=ppt/slides/slide14.xml><?xml version="1.0" encoding="utf-8"?>
+<p:sld xmlns:a="http://schemas.openxmlformats.org/drawingml/2006/main" xmlns:r="http://schemas.openxmlformats.org/officeDocument/2006/relationships" xmlns:p="http://schemas.openxmlformats.org/presentationml/2006/main">
+  <p:cSld>
+    <p:spTree>
+      <p:nvGrpSpPr>
+        <p:cNvPr id="1" name=""/>
+        <p:cNvGrpSpPr/>
+        <p:nvPr/>
+      </p:nvGrpSpPr>
+      <p:grpSpPr>
+        <a:xfrm>
+          <a:off x="0" y="0"/>
+          <a:ext cx="0" cy="0"/>
+          <a:chOff x="0" y="0"/>
+          <a:chExt cx="0" cy="0"/>
+        </a:xfrm>
+      </p:grpSpPr>
+      <p:sp>
+        <p:nvSpPr>
+          <p:cNvPr id="2" name="Title 1"/>
+          <p:cNvSpPr>
+            <a:spLocks noGrp="1"/>
+          </p:cNvSpPr>
+          <p:nvPr>
+            <p:ph type="title"/>
+          </p:nvPr>
+        </p:nvSpPr>
+        <p:spPr/>
+        <p:txBody>
+          <a:bodyPr>
+            <a:normAutofit/>
+          </a:bodyPr>
+          <a:lstStyle/>
+          <a:p>
+            <a:r>
+              <a:rPr lang="en-US" sz="4000" dirty="0"/>
+              <a:t>The Agile </a:t>
+            </a:r>
+            <a:r>
+              <a:rPr lang="en-US" sz="4000" dirty="0" smtClean="0"/>
+              <a:t>Manifesto</a:t>
+            </a:r>
+            <a:endParaRPr lang="en-US" sz="4000" dirty="0"/>
+          </a:p>
+        </p:txBody>
+      </p:sp>
+      <p:sp>
+        <p:nvSpPr>
+          <p:cNvPr id="3" name="Content Placeholder 2"/>
+          <p:cNvSpPr>
+            <a:spLocks noGrp="1"/>
+          </p:cNvSpPr>
+          <p:nvPr>
+            <p:ph sz="half" idx="1"/>
+          </p:nvPr>
+        </p:nvSpPr>
+        <p:spPr>
+          <a:xfrm>
+            <a:off x="677334" y="1600200"/>
+            <a:ext cx="5837766" cy="4441161"/>
+          </a:xfrm>
+        </p:spPr>
+        <p:txBody>
+          <a:bodyPr>
+            <a:normAutofit/>
+          </a:bodyPr>
+          <a:lstStyle/>
+          <a:p>
+            <a:pPr lvl="0"/>
+            <a:r>
+              <a:rPr lang="bg-BG" sz="3600" dirty="0"/>
+              <a:t>Проекти се изграждат от мотивирани личности. Дайте им средата и подкрепата, от които се нуждаят и им гласувайте доверие, че ще свършат работата.</a:t>
+            </a:r>
+            <a:endParaRPr lang="en-US" sz="3600" dirty="0"/>
+          </a:p>
+        </p:txBody>
+      </p:sp>
+      <p:pic>
+        <p:nvPicPr>
+          <p:cNvPr id="5" name="Picture 4"/>
+          <p:cNvPicPr>
+            <a:picLocks noChangeAspect="1"/>
+          </p:cNvPicPr>
+          <p:nvPr/>
+        </p:nvPicPr>
+        <p:blipFill>
+          <a:blip r:embed="rId2"/>
+          <a:stretch>
+            <a:fillRect/>
+          </a:stretch>
+        </p:blipFill>
+        <p:spPr>
+          <a:xfrm>
+            <a:off x="6667500" y="2335213"/>
+            <a:ext cx="2892172" cy="2351087"/>
+          </a:xfrm>
+          <a:prstGeom prst="rect">
+            <a:avLst/>
+          </a:prstGeom>
+        </p:spPr>
+      </p:pic>
+    </p:spTree>
+    <p:extLst>
+      <p:ext uri="{BB962C8B-B14F-4D97-AF65-F5344CB8AC3E}">
+        <p14:creationId xmlns:p14="http://schemas.microsoft.com/office/powerpoint/2010/main" val="3890547199"/>
+      </p:ext>
+    </p:extLst>
+  </p:cSld>
+  <p:clrMapOvr>
+    <a:masterClrMapping/>
+  </p:clrMapOvr>
+  <p:timing>
+    <p:tnLst>
+      <p:par>
+        <p:cTn id="1" dur="indefinite" restart="never" nodeType="tmRoot"/>
+      </p:par>
+    </p:tnLst>
+  </p:timing>
+</p:sld>
+</file>
+
+<file path=ppt/slides/slide15.xml><?xml version="1.0" encoding="utf-8"?>
+<p:sld xmlns:a="http://schemas.openxmlformats.org/drawingml/2006/main" xmlns:r="http://schemas.openxmlformats.org/officeDocument/2006/relationships" xmlns:p="http://schemas.openxmlformats.org/presentationml/2006/main">
+  <p:cSld>
+    <p:spTree>
+      <p:nvGrpSpPr>
+        <p:cNvPr id="1" name=""/>
+        <p:cNvGrpSpPr/>
+        <p:nvPr/>
+      </p:nvGrpSpPr>
+      <p:grpSpPr>
+        <a:xfrm>
+          <a:off x="0" y="0"/>
+          <a:ext cx="0" cy="0"/>
+          <a:chOff x="0" y="0"/>
+          <a:chExt cx="0" cy="0"/>
+        </a:xfrm>
+      </p:grpSpPr>
+      <p:sp>
+        <p:nvSpPr>
+          <p:cNvPr id="2" name="Title 1"/>
+          <p:cNvSpPr>
+            <a:spLocks noGrp="1"/>
+          </p:cNvSpPr>
+          <p:nvPr>
+            <p:ph type="title"/>
+          </p:nvPr>
+        </p:nvSpPr>
+        <p:spPr/>
+        <p:txBody>
+          <a:bodyPr>
+            <a:normAutofit/>
+          </a:bodyPr>
+          <a:lstStyle/>
+          <a:p>
+            <a:r>
+              <a:rPr lang="en-US" sz="4000" dirty="0"/>
+              <a:t>The Agile </a:t>
+            </a:r>
+            <a:r>
+              <a:rPr lang="en-US" sz="4000" dirty="0" smtClean="0"/>
+              <a:t>Manifesto</a:t>
+            </a:r>
+            <a:endParaRPr lang="en-US" sz="4000" dirty="0"/>
+          </a:p>
+        </p:txBody>
+      </p:sp>
+      <p:sp>
+        <p:nvSpPr>
+          <p:cNvPr id="3" name="Content Placeholder 2"/>
+          <p:cNvSpPr>
+            <a:spLocks noGrp="1"/>
+          </p:cNvSpPr>
+          <p:nvPr>
+            <p:ph sz="half" idx="1"/>
+          </p:nvPr>
+        </p:nvSpPr>
+        <p:spPr>
+          <a:xfrm>
+            <a:off x="677334" y="1600200"/>
+            <a:ext cx="5837766" cy="4441161"/>
+          </a:xfrm>
+        </p:spPr>
+        <p:txBody>
+          <a:bodyPr>
+            <a:normAutofit/>
+          </a:bodyPr>
+          <a:lstStyle/>
+          <a:p>
+            <a:pPr lvl="0"/>
+            <a:r>
+              <a:rPr lang="bg-BG" sz="3600" dirty="0"/>
+              <a:t>Най-ефективният и най-ефикасен метод за предаване на информация към и вътре в екипа от разработчици е разговорът лице в лице.</a:t>
+            </a:r>
+            <a:endParaRPr lang="en-US" sz="3600" dirty="0"/>
+          </a:p>
+        </p:txBody>
+      </p:sp>
+      <p:pic>
+        <p:nvPicPr>
+          <p:cNvPr id="4" name="Picture 3"/>
+          <p:cNvPicPr>
+            <a:picLocks noChangeAspect="1"/>
+          </p:cNvPicPr>
+          <p:nvPr/>
+        </p:nvPicPr>
+        <p:blipFill>
+          <a:blip r:embed="rId2"/>
+          <a:stretch>
+            <a:fillRect/>
+          </a:stretch>
+        </p:blipFill>
+        <p:spPr>
+          <a:xfrm>
+            <a:off x="6813550" y="1600200"/>
+            <a:ext cx="2689832" cy="3519488"/>
+          </a:xfrm>
+          <a:prstGeom prst="rect">
+            <a:avLst/>
+          </a:prstGeom>
+        </p:spPr>
+      </p:pic>
+    </p:spTree>
+    <p:extLst>
+      <p:ext uri="{BB962C8B-B14F-4D97-AF65-F5344CB8AC3E}">
+        <p14:creationId xmlns:p14="http://schemas.microsoft.com/office/powerpoint/2010/main" val="827438094"/>
+      </p:ext>
+    </p:extLst>
+  </p:cSld>
+  <p:clrMapOvr>
+    <a:masterClrMapping/>
+  </p:clrMapOvr>
+  <p:timing>
+    <p:tnLst>
+      <p:par>
+        <p:cTn id="1" dur="indefinite" restart="never" nodeType="tmRoot"/>
+      </p:par>
+    </p:tnLst>
+  </p:timing>
+</p:sld>
+</file>
+
+<file path=ppt/slides/slide16.xml><?xml version="1.0" encoding="utf-8"?>
+<p:sld xmlns:a="http://schemas.openxmlformats.org/drawingml/2006/main" xmlns:r="http://schemas.openxmlformats.org/officeDocument/2006/relationships" xmlns:p="http://schemas.openxmlformats.org/presentationml/2006/main">
+  <p:cSld>
+    <p:spTree>
+      <p:nvGrpSpPr>
+        <p:cNvPr id="1" name=""/>
+        <p:cNvGrpSpPr/>
+        <p:nvPr/>
+      </p:nvGrpSpPr>
+      <p:grpSpPr>
+        <a:xfrm>
+          <a:off x="0" y="0"/>
+          <a:ext cx="0" cy="0"/>
+          <a:chOff x="0" y="0"/>
+          <a:chExt cx="0" cy="0"/>
+        </a:xfrm>
+      </p:grpSpPr>
+      <p:sp>
+        <p:nvSpPr>
+          <p:cNvPr id="2" name="Title 1"/>
+          <p:cNvSpPr>
+            <a:spLocks noGrp="1"/>
+          </p:cNvSpPr>
+          <p:nvPr>
+            <p:ph type="title"/>
+          </p:nvPr>
+        </p:nvSpPr>
+        <p:spPr/>
+        <p:txBody>
+          <a:bodyPr>
+            <a:normAutofit/>
+          </a:bodyPr>
+          <a:lstStyle/>
+          <a:p>
+            <a:r>
+              <a:rPr lang="en-US" sz="4000" dirty="0"/>
+              <a:t>The Agile </a:t>
+            </a:r>
+            <a:r>
+              <a:rPr lang="en-US" sz="4000" dirty="0" smtClean="0"/>
+              <a:t>Manifesto</a:t>
+            </a:r>
+            <a:endParaRPr lang="en-US" sz="4000" dirty="0"/>
+          </a:p>
+        </p:txBody>
+      </p:sp>
+      <p:sp>
+        <p:nvSpPr>
+          <p:cNvPr id="3" name="Content Placeholder 2"/>
+          <p:cNvSpPr>
+            <a:spLocks noGrp="1"/>
+          </p:cNvSpPr>
+          <p:nvPr>
+            <p:ph sz="half" idx="1"/>
+          </p:nvPr>
+        </p:nvSpPr>
+        <p:spPr>
+          <a:xfrm>
+            <a:off x="677334" y="1600200"/>
+            <a:ext cx="5837766" cy="4441161"/>
+          </a:xfrm>
+        </p:spPr>
+        <p:txBody>
+          <a:bodyPr>
+            <a:normAutofit/>
+          </a:bodyPr>
+          <a:lstStyle/>
+          <a:p>
+            <a:pPr lvl="0"/>
+            <a:r>
+              <a:rPr lang="bg-BG" sz="3600" dirty="0"/>
+              <a:t>Работещият софтуер е основната мярка на прогреса.</a:t>
+            </a:r>
+            <a:endParaRPr lang="en-US" sz="3600" dirty="0"/>
+          </a:p>
+        </p:txBody>
+      </p:sp>
+      <p:pic>
+        <p:nvPicPr>
+          <p:cNvPr id="5" name="Picture 4"/>
+          <p:cNvPicPr>
+            <a:picLocks noChangeAspect="1"/>
+          </p:cNvPicPr>
+          <p:nvPr/>
+        </p:nvPicPr>
+        <p:blipFill>
+          <a:blip r:embed="rId2"/>
+          <a:stretch>
+            <a:fillRect/>
+          </a:stretch>
+        </p:blipFill>
+        <p:spPr>
+          <a:xfrm>
+            <a:off x="6515100" y="1727201"/>
+            <a:ext cx="3097037" cy="3314700"/>
+          </a:xfrm>
+          <a:prstGeom prst="rect">
+            <a:avLst/>
+          </a:prstGeom>
+        </p:spPr>
+      </p:pic>
+    </p:spTree>
+    <p:extLst>
+      <p:ext uri="{BB962C8B-B14F-4D97-AF65-F5344CB8AC3E}">
+        <p14:creationId xmlns:p14="http://schemas.microsoft.com/office/powerpoint/2010/main" val="4268266961"/>
+      </p:ext>
+    </p:extLst>
+  </p:cSld>
+  <p:clrMapOvr>
+    <a:masterClrMapping/>
+  </p:clrMapOvr>
+  <p:timing>
+    <p:tnLst>
+      <p:par>
+        <p:cTn id="1" dur="indefinite" restart="never" nodeType="tmRoot"/>
+      </p:par>
+    </p:tnLst>
+  </p:timing>
+</p:sld>
+</file>
+
+<file path=ppt/slides/slide17.xml><?xml version="1.0" encoding="utf-8"?>
+<p:sld xmlns:a="http://schemas.openxmlformats.org/drawingml/2006/main" xmlns:r="http://schemas.openxmlformats.org/officeDocument/2006/relationships" xmlns:p="http://schemas.openxmlformats.org/presentationml/2006/main">
+  <p:cSld>
+    <p:spTree>
+      <p:nvGrpSpPr>
+        <p:cNvPr id="1" name=""/>
+        <p:cNvGrpSpPr/>
+        <p:nvPr/>
+      </p:nvGrpSpPr>
+      <p:grpSpPr>
+        <a:xfrm>
+          <a:off x="0" y="0"/>
+          <a:ext cx="0" cy="0"/>
+          <a:chOff x="0" y="0"/>
+          <a:chExt cx="0" cy="0"/>
+        </a:xfrm>
+      </p:grpSpPr>
+      <p:sp>
+        <p:nvSpPr>
+          <p:cNvPr id="2" name="Title 1"/>
+          <p:cNvSpPr>
+            <a:spLocks noGrp="1"/>
+          </p:cNvSpPr>
+          <p:nvPr>
+            <p:ph type="title"/>
+          </p:nvPr>
+        </p:nvSpPr>
+        <p:spPr/>
+        <p:txBody>
+          <a:bodyPr>
+            <a:normAutofit/>
+          </a:bodyPr>
+          <a:lstStyle/>
+          <a:p>
+            <a:r>
+              <a:rPr lang="en-US" sz="4000" dirty="0"/>
+              <a:t>The Agile </a:t>
+            </a:r>
+            <a:r>
+              <a:rPr lang="en-US" sz="4000" dirty="0" smtClean="0"/>
+              <a:t>Manifesto</a:t>
+            </a:r>
+            <a:endParaRPr lang="en-US" sz="4000" dirty="0"/>
+          </a:p>
+        </p:txBody>
+      </p:sp>
+      <p:sp>
+        <p:nvSpPr>
+          <p:cNvPr id="3" name="Content Placeholder 2"/>
+          <p:cNvSpPr>
+            <a:spLocks noGrp="1"/>
+          </p:cNvSpPr>
+          <p:nvPr>
+            <p:ph sz="half" idx="1"/>
+          </p:nvPr>
+        </p:nvSpPr>
+        <p:spPr>
+          <a:xfrm>
+            <a:off x="677334" y="1600200"/>
+            <a:ext cx="5837766" cy="4838700"/>
+          </a:xfrm>
+        </p:spPr>
+        <p:txBody>
+          <a:bodyPr>
+            <a:normAutofit lnSpcReduction="10000"/>
+          </a:bodyPr>
+          <a:lstStyle/>
+          <a:p>
+            <a:pPr lvl="0"/>
+            <a:r>
+              <a:rPr lang="bg-BG" sz="3600" dirty="0"/>
+              <a:t>Agile процесите насърчават непрекъснатата разработка. Спонсорите, разработчиците и потребителите трябва да могат да поддържат постоянен ритъм безсрочно.</a:t>
+            </a:r>
+            <a:endParaRPr lang="en-US" sz="3600" dirty="0"/>
+          </a:p>
+        </p:txBody>
+      </p:sp>
+      <p:pic>
+        <p:nvPicPr>
+          <p:cNvPr id="4" name="Picture 3"/>
+          <p:cNvPicPr>
+            <a:picLocks noChangeAspect="1"/>
+          </p:cNvPicPr>
+          <p:nvPr/>
+        </p:nvPicPr>
+        <p:blipFill>
+          <a:blip r:embed="rId2"/>
+          <a:stretch>
+            <a:fillRect/>
+          </a:stretch>
+        </p:blipFill>
+        <p:spPr>
+          <a:xfrm>
+            <a:off x="7040563" y="2565400"/>
+            <a:ext cx="2430097" cy="2120900"/>
+          </a:xfrm>
+          <a:prstGeom prst="rect">
+            <a:avLst/>
+          </a:prstGeom>
+        </p:spPr>
+      </p:pic>
+    </p:spTree>
+    <p:extLst>
+      <p:ext uri="{BB962C8B-B14F-4D97-AF65-F5344CB8AC3E}">
+        <p14:creationId xmlns:p14="http://schemas.microsoft.com/office/powerpoint/2010/main" val="3053188450"/>
+      </p:ext>
+    </p:extLst>
+  </p:cSld>
+  <p:clrMapOvr>
+    <a:masterClrMapping/>
+  </p:clrMapOvr>
+  <p:timing>
+    <p:tnLst>
+      <p:par>
+        <p:cTn id="1" dur="indefinite" restart="never" nodeType="tmRoot"/>
+      </p:par>
+    </p:tnLst>
+  </p:timing>
+</p:sld>
+</file>
+
+<file path=ppt/slides/slide18.xml><?xml version="1.0" encoding="utf-8"?>
+<p:sld xmlns:a="http://schemas.openxmlformats.org/drawingml/2006/main" xmlns:r="http://schemas.openxmlformats.org/officeDocument/2006/relationships" xmlns:p="http://schemas.openxmlformats.org/presentationml/2006/main">
+  <p:cSld>
+    <p:spTree>
+      <p:nvGrpSpPr>
+        <p:cNvPr id="1" name=""/>
+        <p:cNvGrpSpPr/>
+        <p:nvPr/>
+      </p:nvGrpSpPr>
+      <p:grpSpPr>
+        <a:xfrm>
+          <a:off x="0" y="0"/>
+          <a:ext cx="0" cy="0"/>
+          <a:chOff x="0" y="0"/>
+          <a:chExt cx="0" cy="0"/>
+        </a:xfrm>
+      </p:grpSpPr>
+      <p:sp>
+        <p:nvSpPr>
+          <p:cNvPr id="2" name="Title 1"/>
+          <p:cNvSpPr>
+            <a:spLocks noGrp="1"/>
+          </p:cNvSpPr>
+          <p:nvPr>
+            <p:ph type="title"/>
+          </p:nvPr>
+        </p:nvSpPr>
+        <p:spPr/>
+        <p:txBody>
+          <a:bodyPr>
+            <a:normAutofit/>
+          </a:bodyPr>
+          <a:lstStyle/>
+          <a:p>
+            <a:r>
+              <a:rPr lang="en-US" sz="4000" dirty="0"/>
+              <a:t>The Agile </a:t>
+            </a:r>
+            <a:r>
+              <a:rPr lang="en-US" sz="4000" dirty="0" smtClean="0"/>
+              <a:t>Manifesto</a:t>
+            </a:r>
+            <a:endParaRPr lang="en-US" sz="4000" dirty="0"/>
+          </a:p>
+        </p:txBody>
+      </p:sp>
+      <p:sp>
+        <p:nvSpPr>
+          <p:cNvPr id="3" name="Content Placeholder 2"/>
+          <p:cNvSpPr>
+            <a:spLocks noGrp="1"/>
+          </p:cNvSpPr>
+          <p:nvPr>
+            <p:ph sz="half" idx="1"/>
+          </p:nvPr>
+        </p:nvSpPr>
+        <p:spPr>
+          <a:xfrm>
+            <a:off x="677334" y="1600200"/>
+            <a:ext cx="5837766" cy="4838700"/>
+          </a:xfrm>
+        </p:spPr>
+        <p:txBody>
+          <a:bodyPr>
+            <a:normAutofit/>
+          </a:bodyPr>
+          <a:lstStyle/>
+          <a:p>
+            <a:pPr lvl="0"/>
+            <a:r>
+              <a:rPr lang="bg-BG" sz="3600" dirty="0"/>
+              <a:t>Постоянното внимание към техническо усъвършенстване и добрият дизайн подобряват гъвкавостта.</a:t>
+            </a:r>
+            <a:endParaRPr lang="en-US" sz="3600" dirty="0"/>
+          </a:p>
+        </p:txBody>
+      </p:sp>
+      <p:pic>
+        <p:nvPicPr>
+          <p:cNvPr id="5" name="Picture 4"/>
+          <p:cNvPicPr>
+            <a:picLocks noChangeAspect="1"/>
+          </p:cNvPicPr>
+          <p:nvPr/>
+        </p:nvPicPr>
+        <p:blipFill>
+          <a:blip r:embed="rId2"/>
+          <a:stretch>
+            <a:fillRect/>
+          </a:stretch>
+        </p:blipFill>
+        <p:spPr>
+          <a:xfrm>
+            <a:off x="6730105" y="847725"/>
+            <a:ext cx="2615565" cy="4359275"/>
+          </a:xfrm>
+          <a:prstGeom prst="rect">
+            <a:avLst/>
+          </a:prstGeom>
+        </p:spPr>
+      </p:pic>
+    </p:spTree>
+    <p:extLst>
+      <p:ext uri="{BB962C8B-B14F-4D97-AF65-F5344CB8AC3E}">
+        <p14:creationId xmlns:p14="http://schemas.microsoft.com/office/powerpoint/2010/main" val="3218356154"/>
+      </p:ext>
+    </p:extLst>
+  </p:cSld>
+  <p:clrMapOvr>
+    <a:masterClrMapping/>
+  </p:clrMapOvr>
+  <p:timing>
+    <p:tnLst>
+      <p:par>
+        <p:cTn id="1" dur="indefinite" restart="never" nodeType="tmRoot"/>
+      </p:par>
+    </p:tnLst>
+  </p:timing>
+</p:sld>
+</file>
+
+<file path=ppt/slides/slide19.xml><?xml version="1.0" encoding="utf-8"?>
+<p:sld xmlns:a="http://schemas.openxmlformats.org/drawingml/2006/main" xmlns:r="http://schemas.openxmlformats.org/officeDocument/2006/relationships" xmlns:p="http://schemas.openxmlformats.org/presentationml/2006/main">
+  <p:cSld>
+    <p:spTree>
+      <p:nvGrpSpPr>
+        <p:cNvPr id="1" name=""/>
+        <p:cNvGrpSpPr/>
+        <p:nvPr/>
+      </p:nvGrpSpPr>
+      <p:grpSpPr>
+        <a:xfrm>
+          <a:off x="0" y="0"/>
+          <a:ext cx="0" cy="0"/>
+          <a:chOff x="0" y="0"/>
+          <a:chExt cx="0" cy="0"/>
+        </a:xfrm>
+      </p:grpSpPr>
+      <p:sp>
+        <p:nvSpPr>
+          <p:cNvPr id="2" name="Title 1"/>
+          <p:cNvSpPr>
+            <a:spLocks noGrp="1"/>
+          </p:cNvSpPr>
+          <p:nvPr>
+            <p:ph type="title"/>
+          </p:nvPr>
+        </p:nvSpPr>
+        <p:spPr/>
+        <p:txBody>
+          <a:bodyPr>
+            <a:normAutofit/>
+          </a:bodyPr>
+          <a:lstStyle/>
+          <a:p>
+            <a:r>
+              <a:rPr lang="en-US" sz="4000" dirty="0"/>
+              <a:t>The Agile </a:t>
+            </a:r>
+            <a:r>
+              <a:rPr lang="en-US" sz="4000" dirty="0" smtClean="0"/>
+              <a:t>Manifesto</a:t>
+            </a:r>
+            <a:endParaRPr lang="en-US" sz="4000" dirty="0"/>
+          </a:p>
+        </p:txBody>
+      </p:sp>
+      <p:sp>
+        <p:nvSpPr>
+          <p:cNvPr id="3" name="Content Placeholder 2"/>
+          <p:cNvSpPr>
+            <a:spLocks noGrp="1"/>
+          </p:cNvSpPr>
+          <p:nvPr>
+            <p:ph sz="half" idx="1"/>
+          </p:nvPr>
+        </p:nvSpPr>
+        <p:spPr>
+          <a:xfrm>
+            <a:off x="677334" y="1600200"/>
+            <a:ext cx="5837766" cy="4838700"/>
+          </a:xfrm>
+        </p:spPr>
+        <p:txBody>
+          <a:bodyPr>
+            <a:normAutofit/>
+          </a:bodyPr>
+          <a:lstStyle/>
+          <a:p>
+            <a:pPr lvl="0"/>
+            <a:r>
+              <a:rPr lang="bg-BG" sz="3600" dirty="0"/>
+              <a:t>Простотата - изкуството да се максимизира работата, която не е нужно да се върши - е от изключително значение.</a:t>
+            </a:r>
+            <a:endParaRPr lang="en-US" sz="3600" dirty="0"/>
+          </a:p>
+        </p:txBody>
+      </p:sp>
+      <p:pic>
+        <p:nvPicPr>
+          <p:cNvPr id="4" name="Picture 3"/>
+          <p:cNvPicPr>
+            <a:picLocks noChangeAspect="1"/>
+          </p:cNvPicPr>
+          <p:nvPr/>
+        </p:nvPicPr>
+        <p:blipFill>
+          <a:blip r:embed="rId2"/>
+          <a:stretch>
+            <a:fillRect/>
+          </a:stretch>
+        </p:blipFill>
+        <p:spPr>
+          <a:xfrm>
+            <a:off x="6799970" y="2032001"/>
+            <a:ext cx="2645429" cy="2895600"/>
+          </a:xfrm>
+          <a:prstGeom prst="rect">
+            <a:avLst/>
+          </a:prstGeom>
+        </p:spPr>
+      </p:pic>
+    </p:spTree>
+    <p:extLst>
+      <p:ext uri="{BB962C8B-B14F-4D97-AF65-F5344CB8AC3E}">
+        <p14:creationId xmlns:p14="http://schemas.microsoft.com/office/powerpoint/2010/main" val="2636587606"/>
       </p:ext>
     </p:extLst>
   </p:cSld>
@@ -5870,14 +7126,16 @@
           </a:xfrm>
         </p:spPr>
         <p:txBody>
-          <a:bodyPr/>
-          <a:lstStyle/>
-          <a:p>
-            <a:r>
-              <a:rPr lang="en-US" dirty="0" smtClean="0"/>
+          <a:bodyPr>
+            <a:noAutofit/>
+          </a:bodyPr>
+          <a:lstStyle/>
+          <a:p>
+            <a:r>
+              <a:rPr lang="en-US" sz="4400" dirty="0" smtClean="0"/>
               <a:t>Agenda</a:t>
             </a:r>
-            <a:endParaRPr lang="en-US" dirty="0"/>
+            <a:endParaRPr lang="en-US" sz="4400" dirty="0"/>
           </a:p>
         </p:txBody>
       </p:sp>
@@ -5893,123 +7151,115 @@
         </p:nvSpPr>
         <p:spPr>
           <a:xfrm>
-            <a:off x="677334" y="1358901"/>
-            <a:ext cx="8596668" cy="4682462"/>
+            <a:off x="677334" y="1739899"/>
+            <a:ext cx="8596668" cy="4762501"/>
           </a:xfrm>
         </p:spPr>
         <p:txBody>
-          <a:bodyPr/>
-          <a:lstStyle/>
-          <a:p>
-            <a:r>
-              <a:rPr lang="en-US" dirty="0" err="1"/>
+          <a:bodyPr>
+            <a:noAutofit/>
+          </a:bodyPr>
+          <a:lstStyle/>
+          <a:p>
+            <a:r>
+              <a:rPr lang="en-US" sz="3600" dirty="0" err="1"/>
               <a:t>Какво</a:t>
             </a:r>
             <a:r>
-              <a:rPr lang="en-US" dirty="0"/>
+              <a:rPr lang="en-US" sz="3600" dirty="0"/>
               <a:t> е </a:t>
             </a:r>
             <a:r>
-              <a:rPr lang="en-US" dirty="0" smtClean="0"/>
+              <a:rPr lang="en-US" sz="3600" dirty="0" smtClean="0"/>
               <a:t>Agile</a:t>
             </a:r>
           </a:p>
           <a:p>
             <a:r>
-              <a:rPr lang="en-US" dirty="0" err="1"/>
+              <a:rPr lang="en-US" sz="3600" dirty="0" err="1"/>
               <a:t>Основни</a:t>
             </a:r>
             <a:r>
-              <a:rPr lang="en-US" dirty="0"/>
+              <a:rPr lang="en-US" sz="3600" dirty="0"/>
               <a:t> </a:t>
             </a:r>
             <a:r>
-              <a:rPr lang="en-US" dirty="0" err="1"/>
+              <a:rPr lang="en-US" sz="3600" dirty="0" err="1"/>
               <a:t>стъпки</a:t>
             </a:r>
             <a:r>
-              <a:rPr lang="en-US" dirty="0"/>
+              <a:rPr lang="en-US" sz="3600" dirty="0"/>
               <a:t> в </a:t>
             </a:r>
             <a:r>
-              <a:rPr lang="en-US" dirty="0" smtClean="0"/>
+              <a:rPr lang="en-US" sz="3600" dirty="0" smtClean="0"/>
               <a:t>Agile</a:t>
             </a:r>
           </a:p>
           <a:p>
             <a:r>
-              <a:rPr lang="en-US" dirty="0" err="1"/>
-              <a:t>Сравнение</a:t>
-            </a:r>
-            <a:r>
-              <a:rPr lang="en-US" dirty="0"/>
+              <a:rPr lang="en-US" sz="3600" dirty="0" smtClean="0"/>
+              <a:t>Agile vs Waterfall</a:t>
+            </a:r>
+          </a:p>
+          <a:p>
+            <a:r>
+              <a:rPr lang="bg-BG" sz="3600" dirty="0"/>
+              <a:t>Позли от прилагане на </a:t>
+            </a:r>
+            <a:r>
+              <a:rPr lang="bg-BG" sz="3600" dirty="0"/>
+              <a:t>Agile</a:t>
+            </a:r>
+            <a:endParaRPr lang="en-US" sz="3600" dirty="0"/>
+          </a:p>
+          <a:p>
+            <a:r>
+              <a:rPr lang="en-US" sz="3600" dirty="0" err="1" smtClean="0"/>
+              <a:t>Видове</a:t>
+            </a:r>
+            <a:r>
+              <a:rPr lang="en-US" sz="3600" dirty="0" smtClean="0"/>
               <a:t> </a:t>
             </a:r>
             <a:r>
-              <a:rPr lang="en-US" dirty="0" err="1"/>
-              <a:t>между</a:t>
-            </a:r>
-            <a:r>
-              <a:rPr lang="en-US" dirty="0"/>
-              <a:t> agile и </a:t>
-            </a:r>
-            <a:r>
-              <a:rPr lang="en-US" dirty="0" err="1"/>
-              <a:t>традиционен</a:t>
-            </a:r>
-            <a:r>
-              <a:rPr lang="en-US" dirty="0"/>
+              <a:rPr lang="en-US" sz="3600" dirty="0"/>
+              <a:t>Agile </a:t>
+            </a:r>
+            <a:r>
+              <a:rPr lang="en-US" sz="3600" dirty="0" err="1" smtClean="0"/>
+              <a:t>методологии</a:t>
+            </a:r>
+            <a:endParaRPr lang="en-US" sz="3600" dirty="0" smtClean="0"/>
+          </a:p>
+          <a:p>
+            <a:r>
+              <a:rPr lang="en-US" sz="3600" dirty="0"/>
+              <a:t>Kanban </a:t>
+            </a:r>
+            <a:r>
+              <a:rPr lang="en-US" sz="3600" dirty="0" err="1"/>
+              <a:t>спрямо</a:t>
+            </a:r>
+            <a:r>
+              <a:rPr lang="en-US" sz="3600" dirty="0"/>
               <a:t> </a:t>
             </a:r>
             <a:r>
-              <a:rPr lang="en-US" dirty="0" err="1" smtClean="0"/>
-              <a:t>метод</a:t>
-            </a:r>
-            <a:endParaRPr lang="en-US" dirty="0" smtClean="0"/>
-          </a:p>
-          <a:p>
-            <a:r>
-              <a:rPr lang="en-US" dirty="0" err="1"/>
-              <a:t>Видове</a:t>
-            </a:r>
-            <a:r>
-              <a:rPr lang="en-US" dirty="0"/>
-              <a:t> Agile </a:t>
-            </a:r>
-            <a:r>
-              <a:rPr lang="en-US" dirty="0" err="1" smtClean="0"/>
+              <a:rPr lang="en-US" sz="3600" dirty="0" smtClean="0"/>
+              <a:t>Scrum</a:t>
+            </a:r>
+          </a:p>
+          <a:p>
+            <a:r>
+              <a:rPr lang="en-US" sz="3600" dirty="0"/>
+              <a:t>Други agile </a:t>
+            </a:r>
+            <a:r>
+              <a:rPr lang="en-US" sz="3600" dirty="0" err="1"/>
               <a:t>методологии</a:t>
             </a:r>
-            <a:endParaRPr lang="en-US" dirty="0" smtClean="0"/>
-          </a:p>
-          <a:p>
-            <a:r>
-              <a:rPr lang="en-US" dirty="0"/>
-              <a:t>Kanban </a:t>
-            </a:r>
-            <a:r>
-              <a:rPr lang="en-US" dirty="0" err="1"/>
-              <a:t>спрямо</a:t>
-            </a:r>
-            <a:r>
-              <a:rPr lang="en-US" dirty="0"/>
-              <a:t> </a:t>
-            </a:r>
-            <a:r>
-              <a:rPr lang="en-US" dirty="0" smtClean="0"/>
-              <a:t>Scrum</a:t>
-            </a:r>
-          </a:p>
-          <a:p>
-            <a:r>
-              <a:rPr lang="en-US" dirty="0"/>
-              <a:t>Други agile </a:t>
-            </a:r>
-            <a:r>
-              <a:rPr lang="en-US" dirty="0" err="1"/>
-              <a:t>методологии</a:t>
-            </a:r>
-            <a:endParaRPr lang="en-US" dirty="0"/>
+            <a:endParaRPr lang="en-US" sz="3600" dirty="0"/>
           </a:p>
         </p:txBody>
       </p:sp>
@@ -6017,6 +7267,1317 @@
     <p:extLst>
       <p:ext uri="{BB962C8B-B14F-4D97-AF65-F5344CB8AC3E}">
         <p14:creationId xmlns:p14="http://schemas.microsoft.com/office/powerpoint/2010/main" val="1695409090"/>
+      </p:ext>
+    </p:extLst>
+  </p:cSld>
+  <p:clrMapOvr>
+    <a:masterClrMapping/>
+  </p:clrMapOvr>
+  <p:timing>
+    <p:tnLst>
+      <p:par>
+        <p:cTn id="1" dur="indefinite" restart="never" nodeType="tmRoot"/>
+      </p:par>
+    </p:tnLst>
+  </p:timing>
+</p:sld>
+</file>
+
+<file path=ppt/slides/slide20.xml><?xml version="1.0" encoding="utf-8"?>
+<p:sld xmlns:a="http://schemas.openxmlformats.org/drawingml/2006/main" xmlns:r="http://schemas.openxmlformats.org/officeDocument/2006/relationships" xmlns:p="http://schemas.openxmlformats.org/presentationml/2006/main">
+  <p:cSld>
+    <p:spTree>
+      <p:nvGrpSpPr>
+        <p:cNvPr id="1" name=""/>
+        <p:cNvGrpSpPr/>
+        <p:nvPr/>
+      </p:nvGrpSpPr>
+      <p:grpSpPr>
+        <a:xfrm>
+          <a:off x="0" y="0"/>
+          <a:ext cx="0" cy="0"/>
+          <a:chOff x="0" y="0"/>
+          <a:chExt cx="0" cy="0"/>
+        </a:xfrm>
+      </p:grpSpPr>
+      <p:sp>
+        <p:nvSpPr>
+          <p:cNvPr id="2" name="Title 1"/>
+          <p:cNvSpPr>
+            <a:spLocks noGrp="1"/>
+          </p:cNvSpPr>
+          <p:nvPr>
+            <p:ph type="title"/>
+          </p:nvPr>
+        </p:nvSpPr>
+        <p:spPr/>
+        <p:txBody>
+          <a:bodyPr>
+            <a:normAutofit/>
+          </a:bodyPr>
+          <a:lstStyle/>
+          <a:p>
+            <a:r>
+              <a:rPr lang="en-US" sz="4000" dirty="0"/>
+              <a:t>The Agile </a:t>
+            </a:r>
+            <a:r>
+              <a:rPr lang="en-US" sz="4000" dirty="0" smtClean="0"/>
+              <a:t>Manifesto</a:t>
+            </a:r>
+            <a:endParaRPr lang="en-US" sz="4000" dirty="0"/>
+          </a:p>
+        </p:txBody>
+      </p:sp>
+      <p:sp>
+        <p:nvSpPr>
+          <p:cNvPr id="3" name="Content Placeholder 2"/>
+          <p:cNvSpPr>
+            <a:spLocks noGrp="1"/>
+          </p:cNvSpPr>
+          <p:nvPr>
+            <p:ph sz="half" idx="1"/>
+          </p:nvPr>
+        </p:nvSpPr>
+        <p:spPr>
+          <a:xfrm>
+            <a:off x="677334" y="1600200"/>
+            <a:ext cx="5837766" cy="4838700"/>
+          </a:xfrm>
+        </p:spPr>
+        <p:txBody>
+          <a:bodyPr>
+            <a:normAutofit/>
+          </a:bodyPr>
+          <a:lstStyle/>
+          <a:p>
+            <a:pPr lvl="0"/>
+            <a:r>
+              <a:rPr lang="bg-BG" sz="3600" dirty="0"/>
+              <a:t>Най-добрите архитектури, изисквания и дизайни произлизат от самоорганизиращи се екипи.</a:t>
+            </a:r>
+            <a:endParaRPr lang="en-US" sz="3600" dirty="0"/>
+          </a:p>
+        </p:txBody>
+      </p:sp>
+      <p:pic>
+        <p:nvPicPr>
+          <p:cNvPr id="5" name="Picture 4"/>
+          <p:cNvPicPr>
+            <a:picLocks noChangeAspect="1"/>
+          </p:cNvPicPr>
+          <p:nvPr/>
+        </p:nvPicPr>
+        <p:blipFill>
+          <a:blip r:embed="rId2"/>
+          <a:stretch>
+            <a:fillRect/>
+          </a:stretch>
+        </p:blipFill>
+        <p:spPr>
+          <a:xfrm>
+            <a:off x="6220860" y="1930400"/>
+            <a:ext cx="2907113" cy="2463799"/>
+          </a:xfrm>
+          <a:prstGeom prst="rect">
+            <a:avLst/>
+          </a:prstGeom>
+        </p:spPr>
+      </p:pic>
+    </p:spTree>
+    <p:extLst>
+      <p:ext uri="{BB962C8B-B14F-4D97-AF65-F5344CB8AC3E}">
+        <p14:creationId xmlns:p14="http://schemas.microsoft.com/office/powerpoint/2010/main" val="3002331591"/>
+      </p:ext>
+    </p:extLst>
+  </p:cSld>
+  <p:clrMapOvr>
+    <a:masterClrMapping/>
+  </p:clrMapOvr>
+  <p:timing>
+    <p:tnLst>
+      <p:par>
+        <p:cTn id="1" dur="indefinite" restart="never" nodeType="tmRoot"/>
+      </p:par>
+    </p:tnLst>
+  </p:timing>
+</p:sld>
+</file>
+
+<file path=ppt/slides/slide21.xml><?xml version="1.0" encoding="utf-8"?>
+<p:sld xmlns:a="http://schemas.openxmlformats.org/drawingml/2006/main" xmlns:r="http://schemas.openxmlformats.org/officeDocument/2006/relationships" xmlns:p="http://schemas.openxmlformats.org/presentationml/2006/main">
+  <p:cSld>
+    <p:spTree>
+      <p:nvGrpSpPr>
+        <p:cNvPr id="1" name=""/>
+        <p:cNvGrpSpPr/>
+        <p:nvPr/>
+      </p:nvGrpSpPr>
+      <p:grpSpPr>
+        <a:xfrm>
+          <a:off x="0" y="0"/>
+          <a:ext cx="0" cy="0"/>
+          <a:chOff x="0" y="0"/>
+          <a:chExt cx="0" cy="0"/>
+        </a:xfrm>
+      </p:grpSpPr>
+      <p:sp>
+        <p:nvSpPr>
+          <p:cNvPr id="2" name="Title 1"/>
+          <p:cNvSpPr>
+            <a:spLocks noGrp="1"/>
+          </p:cNvSpPr>
+          <p:nvPr>
+            <p:ph type="title"/>
+          </p:nvPr>
+        </p:nvSpPr>
+        <p:spPr/>
+        <p:txBody>
+          <a:bodyPr>
+            <a:normAutofit/>
+          </a:bodyPr>
+          <a:lstStyle/>
+          <a:p>
+            <a:r>
+              <a:rPr lang="en-US" sz="4000" dirty="0"/>
+              <a:t>The Agile </a:t>
+            </a:r>
+            <a:r>
+              <a:rPr lang="en-US" sz="4000" dirty="0" smtClean="0"/>
+              <a:t>Manifesto</a:t>
+            </a:r>
+            <a:endParaRPr lang="en-US" sz="4000" dirty="0"/>
+          </a:p>
+        </p:txBody>
+      </p:sp>
+      <p:sp>
+        <p:nvSpPr>
+          <p:cNvPr id="3" name="Content Placeholder 2"/>
+          <p:cNvSpPr>
+            <a:spLocks noGrp="1"/>
+          </p:cNvSpPr>
+          <p:nvPr>
+            <p:ph sz="half" idx="1"/>
+          </p:nvPr>
+        </p:nvSpPr>
+        <p:spPr>
+          <a:xfrm>
+            <a:off x="677334" y="1600200"/>
+            <a:ext cx="5837766" cy="4838700"/>
+          </a:xfrm>
+        </p:spPr>
+        <p:txBody>
+          <a:bodyPr>
+            <a:normAutofit/>
+          </a:bodyPr>
+          <a:lstStyle/>
+          <a:p>
+            <a:pPr lvl="0"/>
+            <a:r>
+              <a:rPr lang="bg-BG" sz="3600" dirty="0"/>
+              <a:t>През равни интервали от време, екипът обсъжда как да стане по-ефективен, след което настройва работата си в съответствие с взетото решение.</a:t>
+            </a:r>
+            <a:endParaRPr lang="en-US" sz="3600" dirty="0"/>
+          </a:p>
+        </p:txBody>
+      </p:sp>
+      <p:pic>
+        <p:nvPicPr>
+          <p:cNvPr id="4" name="Picture 3"/>
+          <p:cNvPicPr>
+            <a:picLocks noChangeAspect="1"/>
+          </p:cNvPicPr>
+          <p:nvPr/>
+        </p:nvPicPr>
+        <p:blipFill>
+          <a:blip r:embed="rId2"/>
+          <a:stretch>
+            <a:fillRect/>
+          </a:stretch>
+        </p:blipFill>
+        <p:spPr>
+          <a:xfrm>
+            <a:off x="6515100" y="2603500"/>
+            <a:ext cx="2887305" cy="1689100"/>
+          </a:xfrm>
+          <a:prstGeom prst="rect">
+            <a:avLst/>
+          </a:prstGeom>
+        </p:spPr>
+      </p:pic>
+    </p:spTree>
+    <p:extLst>
+      <p:ext uri="{BB962C8B-B14F-4D97-AF65-F5344CB8AC3E}">
+        <p14:creationId xmlns:p14="http://schemas.microsoft.com/office/powerpoint/2010/main" val="3792670351"/>
+      </p:ext>
+    </p:extLst>
+  </p:cSld>
+  <p:clrMapOvr>
+    <a:masterClrMapping/>
+  </p:clrMapOvr>
+  <p:timing>
+    <p:tnLst>
+      <p:par>
+        <p:cTn id="1" dur="indefinite" restart="never" nodeType="tmRoot"/>
+      </p:par>
+    </p:tnLst>
+  </p:timing>
+</p:sld>
+</file>
+
+<file path=ppt/slides/slide3.xml><?xml version="1.0" encoding="utf-8"?>
+<p:sld xmlns:a="http://schemas.openxmlformats.org/drawingml/2006/main" xmlns:r="http://schemas.openxmlformats.org/officeDocument/2006/relationships" xmlns:p="http://schemas.openxmlformats.org/presentationml/2006/main">
+  <p:cSld>
+    <p:spTree>
+      <p:nvGrpSpPr>
+        <p:cNvPr id="1" name=""/>
+        <p:cNvGrpSpPr/>
+        <p:nvPr/>
+      </p:nvGrpSpPr>
+      <p:grpSpPr>
+        <a:xfrm>
+          <a:off x="0" y="0"/>
+          <a:ext cx="0" cy="0"/>
+          <a:chOff x="0" y="0"/>
+          <a:chExt cx="0" cy="0"/>
+        </a:xfrm>
+      </p:grpSpPr>
+      <p:sp>
+        <p:nvSpPr>
+          <p:cNvPr id="2" name="Title 1"/>
+          <p:cNvSpPr>
+            <a:spLocks noGrp="1"/>
+          </p:cNvSpPr>
+          <p:nvPr>
+            <p:ph type="title"/>
+          </p:nvPr>
+        </p:nvSpPr>
+        <p:spPr>
+          <a:xfrm>
+            <a:off x="677334" y="609600"/>
+            <a:ext cx="8596668" cy="762000"/>
+          </a:xfrm>
+        </p:spPr>
+        <p:txBody>
+          <a:bodyPr>
+            <a:normAutofit/>
+          </a:bodyPr>
+          <a:lstStyle/>
+          <a:p>
+            <a:r>
+              <a:rPr lang="bg-BG" sz="4400" dirty="0" smtClean="0"/>
+              <a:t>Какво е </a:t>
+            </a:r>
+            <a:r>
+              <a:rPr lang="en-US" sz="4400" dirty="0" smtClean="0"/>
+              <a:t>Agile</a:t>
+            </a:r>
+            <a:endParaRPr lang="en-US" sz="4400" dirty="0"/>
+          </a:p>
+        </p:txBody>
+      </p:sp>
+      <p:sp>
+        <p:nvSpPr>
+          <p:cNvPr id="3" name="Content Placeholder 2"/>
+          <p:cNvSpPr>
+            <a:spLocks noGrp="1"/>
+          </p:cNvSpPr>
+          <p:nvPr>
+            <p:ph idx="1"/>
+          </p:nvPr>
+        </p:nvSpPr>
+        <p:spPr>
+          <a:xfrm>
+            <a:off x="677334" y="1625599"/>
+            <a:ext cx="8596668" cy="4415763"/>
+          </a:xfrm>
+        </p:spPr>
+        <p:txBody>
+          <a:bodyPr>
+            <a:normAutofit/>
+          </a:bodyPr>
+          <a:lstStyle/>
+          <a:p>
+            <a:r>
+              <a:rPr lang="bg-BG" sz="3600" dirty="0" smtClean="0"/>
+              <a:t>Методологии </a:t>
+            </a:r>
+          </a:p>
+          <a:p>
+            <a:r>
+              <a:rPr lang="bg-BG" sz="3600" dirty="0"/>
+              <a:t>А</a:t>
+            </a:r>
+            <a:r>
+              <a:rPr lang="bg-BG" sz="3600" dirty="0" smtClean="0"/>
+              <a:t>даптивното планиране</a:t>
+            </a:r>
+          </a:p>
+          <a:p>
+            <a:r>
+              <a:rPr lang="bg-BG" sz="3600" dirty="0" smtClean="0"/>
+              <a:t>Итеративен </a:t>
+            </a:r>
+            <a:r>
+              <a:rPr lang="bg-BG" sz="3600" dirty="0"/>
+              <a:t>подход </a:t>
+            </a:r>
+            <a:endParaRPr lang="bg-BG" sz="3600" dirty="0" smtClean="0"/>
+          </a:p>
+          <a:p>
+            <a:r>
+              <a:rPr lang="bg-BG" sz="3600" dirty="0" smtClean="0"/>
+              <a:t>Принципи </a:t>
+            </a:r>
+            <a:r>
+              <a:rPr lang="bg-BG" sz="3600" dirty="0"/>
+              <a:t>и </a:t>
+            </a:r>
+            <a:r>
+              <a:rPr lang="bg-BG" sz="3600" dirty="0" smtClean="0"/>
+              <a:t>ценности</a:t>
+            </a:r>
+          </a:p>
+          <a:p>
+            <a:r>
+              <a:rPr lang="bg-BG" sz="3600" dirty="0" smtClean="0"/>
+              <a:t>Ранно </a:t>
+            </a:r>
+            <a:r>
+              <a:rPr lang="bg-BG" sz="3600" dirty="0"/>
+              <a:t>доставяне</a:t>
+            </a:r>
+            <a:endParaRPr lang="en-US" sz="3600" dirty="0"/>
+          </a:p>
+        </p:txBody>
+      </p:sp>
+    </p:spTree>
+    <p:extLst>
+      <p:ext uri="{BB962C8B-B14F-4D97-AF65-F5344CB8AC3E}">
+        <p14:creationId xmlns:p14="http://schemas.microsoft.com/office/powerpoint/2010/main" val="1520112919"/>
+      </p:ext>
+    </p:extLst>
+  </p:cSld>
+  <p:clrMapOvr>
+    <a:masterClrMapping/>
+  </p:clrMapOvr>
+  <p:timing>
+    <p:tnLst>
+      <p:par>
+        <p:cTn id="1" dur="indefinite" restart="never" nodeType="tmRoot"/>
+      </p:par>
+    </p:tnLst>
+  </p:timing>
+</p:sld>
+</file>
+
+<file path=ppt/slides/slide4.xml><?xml version="1.0" encoding="utf-8"?>
+<p:sld xmlns:a="http://schemas.openxmlformats.org/drawingml/2006/main" xmlns:r="http://schemas.openxmlformats.org/officeDocument/2006/relationships" xmlns:p="http://schemas.openxmlformats.org/presentationml/2006/main">
+  <p:cSld>
+    <p:spTree>
+      <p:nvGrpSpPr>
+        <p:cNvPr id="1" name=""/>
+        <p:cNvGrpSpPr/>
+        <p:nvPr/>
+      </p:nvGrpSpPr>
+      <p:grpSpPr>
+        <a:xfrm>
+          <a:off x="0" y="0"/>
+          <a:ext cx="0" cy="0"/>
+          <a:chOff x="0" y="0"/>
+          <a:chExt cx="0" cy="0"/>
+        </a:xfrm>
+      </p:grpSpPr>
+      <p:sp>
+        <p:nvSpPr>
+          <p:cNvPr id="2" name="Title 1"/>
+          <p:cNvSpPr>
+            <a:spLocks noGrp="1"/>
+          </p:cNvSpPr>
+          <p:nvPr>
+            <p:ph type="title"/>
+          </p:nvPr>
+        </p:nvSpPr>
+        <p:spPr>
+          <a:xfrm>
+            <a:off x="677334" y="609600"/>
+            <a:ext cx="8596668" cy="850900"/>
+          </a:xfrm>
+        </p:spPr>
+        <p:txBody>
+          <a:bodyPr>
+            <a:normAutofit/>
+          </a:bodyPr>
+          <a:lstStyle/>
+          <a:p>
+            <a:r>
+              <a:rPr lang="en-US" sz="4400" dirty="0" err="1"/>
+              <a:t>Основни</a:t>
+            </a:r>
+            <a:r>
+              <a:rPr lang="en-US" sz="4400" dirty="0"/>
+              <a:t> </a:t>
+            </a:r>
+            <a:r>
+              <a:rPr lang="en-US" sz="4400" dirty="0" err="1"/>
+              <a:t>стъпки</a:t>
+            </a:r>
+            <a:r>
+              <a:rPr lang="en-US" sz="4400" dirty="0"/>
+              <a:t> в </a:t>
+            </a:r>
+            <a:r>
+              <a:rPr lang="en-US" sz="4400" dirty="0" smtClean="0"/>
+              <a:t>Agile</a:t>
+            </a:r>
+            <a:endParaRPr lang="en-US" sz="4400" dirty="0"/>
+          </a:p>
+        </p:txBody>
+      </p:sp>
+      <p:sp>
+        <p:nvSpPr>
+          <p:cNvPr id="3" name="Content Placeholder 2"/>
+          <p:cNvSpPr>
+            <a:spLocks noGrp="1"/>
+          </p:cNvSpPr>
+          <p:nvPr>
+            <p:ph idx="1"/>
+          </p:nvPr>
+        </p:nvSpPr>
+        <p:spPr>
+          <a:xfrm>
+            <a:off x="677334" y="1778001"/>
+            <a:ext cx="8596668" cy="4263362"/>
+          </a:xfrm>
+        </p:spPr>
+        <p:txBody>
+          <a:bodyPr/>
+          <a:lstStyle/>
+          <a:p>
+            <a:r>
+              <a:rPr lang="en-US" b="1" dirty="0" err="1" smtClean="0"/>
+              <a:t>Проучване</a:t>
+            </a:r>
+            <a:endParaRPr lang="bg-BG" b="1" dirty="0" smtClean="0"/>
+          </a:p>
+          <a:p>
+            <a:pPr marL="0" indent="0">
+              <a:buNone/>
+            </a:pPr>
+            <a:endParaRPr lang="en-US" b="1" dirty="0"/>
+          </a:p>
+          <a:p>
+            <a:pPr marL="0" indent="0">
+              <a:buNone/>
+            </a:pPr>
+            <a:endParaRPr lang="en-US" dirty="0"/>
+          </a:p>
+        </p:txBody>
+      </p:sp>
+      <p:pic>
+        <p:nvPicPr>
+          <p:cNvPr id="5" name="Picture 4"/>
+          <p:cNvPicPr>
+            <a:picLocks noChangeAspect="1"/>
+          </p:cNvPicPr>
+          <p:nvPr/>
+        </p:nvPicPr>
+        <p:blipFill>
+          <a:blip r:embed="rId2"/>
+          <a:stretch>
+            <a:fillRect/>
+          </a:stretch>
+        </p:blipFill>
+        <p:spPr>
+          <a:xfrm>
+            <a:off x="2984500" y="1601514"/>
+            <a:ext cx="5238635" cy="4616335"/>
+          </a:xfrm>
+          <a:prstGeom prst="rect">
+            <a:avLst/>
+          </a:prstGeom>
+        </p:spPr>
+      </p:pic>
+    </p:spTree>
+    <p:extLst>
+      <p:ext uri="{BB962C8B-B14F-4D97-AF65-F5344CB8AC3E}">
+        <p14:creationId xmlns:p14="http://schemas.microsoft.com/office/powerpoint/2010/main" val="3164285727"/>
+      </p:ext>
+    </p:extLst>
+  </p:cSld>
+  <p:clrMapOvr>
+    <a:masterClrMapping/>
+  </p:clrMapOvr>
+  <p:timing>
+    <p:tnLst>
+      <p:par>
+        <p:cTn id="1" dur="indefinite" restart="never" nodeType="tmRoot"/>
+      </p:par>
+    </p:tnLst>
+  </p:timing>
+</p:sld>
+</file>
+
+<file path=ppt/slides/slide5.xml><?xml version="1.0" encoding="utf-8"?>
+<p:sld xmlns:a="http://schemas.openxmlformats.org/drawingml/2006/main" xmlns:r="http://schemas.openxmlformats.org/officeDocument/2006/relationships" xmlns:p="http://schemas.openxmlformats.org/presentationml/2006/main">
+  <p:cSld>
+    <p:spTree>
+      <p:nvGrpSpPr>
+        <p:cNvPr id="1" name=""/>
+        <p:cNvGrpSpPr/>
+        <p:nvPr/>
+      </p:nvGrpSpPr>
+      <p:grpSpPr>
+        <a:xfrm>
+          <a:off x="0" y="0"/>
+          <a:ext cx="0" cy="0"/>
+          <a:chOff x="0" y="0"/>
+          <a:chExt cx="0" cy="0"/>
+        </a:xfrm>
+      </p:grpSpPr>
+      <p:sp>
+        <p:nvSpPr>
+          <p:cNvPr id="2" name="Title 1"/>
+          <p:cNvSpPr>
+            <a:spLocks noGrp="1"/>
+          </p:cNvSpPr>
+          <p:nvPr>
+            <p:ph type="title"/>
+          </p:nvPr>
+        </p:nvSpPr>
+        <p:spPr>
+          <a:xfrm>
+            <a:off x="677334" y="609600"/>
+            <a:ext cx="8596668" cy="850900"/>
+          </a:xfrm>
+        </p:spPr>
+        <p:txBody>
+          <a:bodyPr>
+            <a:normAutofit/>
+          </a:bodyPr>
+          <a:lstStyle/>
+          <a:p>
+            <a:r>
+              <a:rPr lang="en-US" sz="4400" dirty="0" err="1"/>
+              <a:t>Основни</a:t>
+            </a:r>
+            <a:r>
+              <a:rPr lang="en-US" sz="4400" dirty="0"/>
+              <a:t> </a:t>
+            </a:r>
+            <a:r>
+              <a:rPr lang="en-US" sz="4400" dirty="0" err="1"/>
+              <a:t>стъпки</a:t>
+            </a:r>
+            <a:r>
+              <a:rPr lang="en-US" sz="4400" dirty="0"/>
+              <a:t> в </a:t>
+            </a:r>
+            <a:r>
+              <a:rPr lang="en-US" sz="4400" dirty="0" smtClean="0"/>
+              <a:t>Agile</a:t>
+            </a:r>
+            <a:endParaRPr lang="en-US" sz="4400" dirty="0"/>
+          </a:p>
+        </p:txBody>
+      </p:sp>
+      <p:sp>
+        <p:nvSpPr>
+          <p:cNvPr id="3" name="Content Placeholder 2"/>
+          <p:cNvSpPr>
+            <a:spLocks noGrp="1"/>
+          </p:cNvSpPr>
+          <p:nvPr>
+            <p:ph idx="1"/>
+          </p:nvPr>
+        </p:nvSpPr>
+        <p:spPr>
+          <a:xfrm>
+            <a:off x="677334" y="1778001"/>
+            <a:ext cx="8596668" cy="4263362"/>
+          </a:xfrm>
+        </p:spPr>
+        <p:txBody>
+          <a:bodyPr/>
+          <a:lstStyle/>
+          <a:p>
+            <a:r>
+              <a:rPr lang="en-US" b="1" dirty="0" err="1" smtClean="0"/>
+              <a:t>Проучване</a:t>
+            </a:r>
+            <a:endParaRPr lang="bg-BG" b="1" dirty="0" smtClean="0"/>
+          </a:p>
+          <a:p>
+            <a:r>
+              <a:rPr lang="en-US" b="1" dirty="0"/>
+              <a:t>Product Backlog</a:t>
+            </a:r>
+          </a:p>
+          <a:p>
+            <a:endParaRPr lang="bg-BG" b="1" dirty="0" smtClean="0"/>
+          </a:p>
+          <a:p>
+            <a:pPr marL="0" indent="0">
+              <a:buNone/>
+            </a:pPr>
+            <a:endParaRPr lang="en-US" b="1" dirty="0"/>
+          </a:p>
+          <a:p>
+            <a:pPr marL="0" indent="0">
+              <a:buNone/>
+            </a:pPr>
+            <a:endParaRPr lang="en-US" dirty="0"/>
+          </a:p>
+        </p:txBody>
+      </p:sp>
+      <p:pic>
+        <p:nvPicPr>
+          <p:cNvPr id="4" name="Picture 3"/>
+          <p:cNvPicPr>
+            <a:picLocks noChangeAspect="1"/>
+          </p:cNvPicPr>
+          <p:nvPr/>
+        </p:nvPicPr>
+        <p:blipFill>
+          <a:blip r:embed="rId2"/>
+          <a:stretch>
+            <a:fillRect/>
+          </a:stretch>
+        </p:blipFill>
+        <p:spPr>
+          <a:xfrm>
+            <a:off x="2984500" y="1601514"/>
+            <a:ext cx="5238635" cy="4616335"/>
+          </a:xfrm>
+          <a:prstGeom prst="rect">
+            <a:avLst/>
+          </a:prstGeom>
+        </p:spPr>
+      </p:pic>
+    </p:spTree>
+    <p:extLst>
+      <p:ext uri="{BB962C8B-B14F-4D97-AF65-F5344CB8AC3E}">
+        <p14:creationId xmlns:p14="http://schemas.microsoft.com/office/powerpoint/2010/main" val="2348019430"/>
+      </p:ext>
+    </p:extLst>
+  </p:cSld>
+  <p:clrMapOvr>
+    <a:masterClrMapping/>
+  </p:clrMapOvr>
+  <p:timing>
+    <p:tnLst>
+      <p:par>
+        <p:cTn id="1" dur="indefinite" restart="never" nodeType="tmRoot"/>
+      </p:par>
+    </p:tnLst>
+  </p:timing>
+</p:sld>
+</file>
+
+<file path=ppt/slides/slide6.xml><?xml version="1.0" encoding="utf-8"?>
+<p:sld xmlns:a="http://schemas.openxmlformats.org/drawingml/2006/main" xmlns:r="http://schemas.openxmlformats.org/officeDocument/2006/relationships" xmlns:p="http://schemas.openxmlformats.org/presentationml/2006/main">
+  <p:cSld>
+    <p:spTree>
+      <p:nvGrpSpPr>
+        <p:cNvPr id="1" name=""/>
+        <p:cNvGrpSpPr/>
+        <p:nvPr/>
+      </p:nvGrpSpPr>
+      <p:grpSpPr>
+        <a:xfrm>
+          <a:off x="0" y="0"/>
+          <a:ext cx="0" cy="0"/>
+          <a:chOff x="0" y="0"/>
+          <a:chExt cx="0" cy="0"/>
+        </a:xfrm>
+      </p:grpSpPr>
+      <p:sp>
+        <p:nvSpPr>
+          <p:cNvPr id="2" name="Title 1"/>
+          <p:cNvSpPr>
+            <a:spLocks noGrp="1"/>
+          </p:cNvSpPr>
+          <p:nvPr>
+            <p:ph type="title"/>
+          </p:nvPr>
+        </p:nvSpPr>
+        <p:spPr>
+          <a:xfrm>
+            <a:off x="677334" y="609600"/>
+            <a:ext cx="8596668" cy="850900"/>
+          </a:xfrm>
+        </p:spPr>
+        <p:txBody>
+          <a:bodyPr>
+            <a:normAutofit/>
+          </a:bodyPr>
+          <a:lstStyle/>
+          <a:p>
+            <a:r>
+              <a:rPr lang="en-US" sz="4400" dirty="0" err="1"/>
+              <a:t>Основни</a:t>
+            </a:r>
+            <a:r>
+              <a:rPr lang="en-US" sz="4400" dirty="0"/>
+              <a:t> </a:t>
+            </a:r>
+            <a:r>
+              <a:rPr lang="en-US" sz="4400" dirty="0" err="1"/>
+              <a:t>стъпки</a:t>
+            </a:r>
+            <a:r>
+              <a:rPr lang="en-US" sz="4400" dirty="0"/>
+              <a:t> в </a:t>
+            </a:r>
+            <a:r>
+              <a:rPr lang="en-US" sz="4400" dirty="0" smtClean="0"/>
+              <a:t>Agile</a:t>
+            </a:r>
+            <a:endParaRPr lang="en-US" sz="4400" dirty="0"/>
+          </a:p>
+        </p:txBody>
+      </p:sp>
+      <p:sp>
+        <p:nvSpPr>
+          <p:cNvPr id="3" name="Content Placeholder 2"/>
+          <p:cNvSpPr>
+            <a:spLocks noGrp="1"/>
+          </p:cNvSpPr>
+          <p:nvPr>
+            <p:ph idx="1"/>
+          </p:nvPr>
+        </p:nvSpPr>
+        <p:spPr>
+          <a:xfrm>
+            <a:off x="677334" y="1778001"/>
+            <a:ext cx="8596668" cy="4263362"/>
+          </a:xfrm>
+        </p:spPr>
+        <p:txBody>
+          <a:bodyPr/>
+          <a:lstStyle/>
+          <a:p>
+            <a:r>
+              <a:rPr lang="en-US" b="1" dirty="0" err="1" smtClean="0"/>
+              <a:t>Проучване</a:t>
+            </a:r>
+            <a:endParaRPr lang="bg-BG" b="1" dirty="0" smtClean="0"/>
+          </a:p>
+          <a:p>
+            <a:r>
+              <a:rPr lang="en-US" b="1" dirty="0"/>
+              <a:t>Product </a:t>
+            </a:r>
+            <a:r>
+              <a:rPr lang="en-US" b="1" dirty="0" smtClean="0"/>
+              <a:t>Backlog</a:t>
+            </a:r>
+            <a:endParaRPr lang="bg-BG" b="1" dirty="0" smtClean="0"/>
+          </a:p>
+          <a:p>
+            <a:r>
+              <a:rPr lang="bg-BG" b="1" dirty="0" smtClean="0"/>
+              <a:t>Работа</a:t>
+            </a:r>
+            <a:endParaRPr lang="en-US" b="1" dirty="0"/>
+          </a:p>
+          <a:p>
+            <a:endParaRPr lang="en-US" b="1" dirty="0"/>
+          </a:p>
+          <a:p>
+            <a:endParaRPr lang="bg-BG" b="1" dirty="0" smtClean="0"/>
+          </a:p>
+          <a:p>
+            <a:pPr marL="0" indent="0">
+              <a:buNone/>
+            </a:pPr>
+            <a:endParaRPr lang="en-US" b="1" dirty="0"/>
+          </a:p>
+          <a:p>
+            <a:pPr marL="0" indent="0">
+              <a:buNone/>
+            </a:pPr>
+            <a:endParaRPr lang="en-US" dirty="0"/>
+          </a:p>
+        </p:txBody>
+      </p:sp>
+      <p:pic>
+        <p:nvPicPr>
+          <p:cNvPr id="4" name="Picture 3"/>
+          <p:cNvPicPr>
+            <a:picLocks noChangeAspect="1"/>
+          </p:cNvPicPr>
+          <p:nvPr/>
+        </p:nvPicPr>
+        <p:blipFill>
+          <a:blip r:embed="rId2"/>
+          <a:stretch>
+            <a:fillRect/>
+          </a:stretch>
+        </p:blipFill>
+        <p:spPr>
+          <a:xfrm>
+            <a:off x="2984500" y="1601514"/>
+            <a:ext cx="5238635" cy="4616335"/>
+          </a:xfrm>
+          <a:prstGeom prst="rect">
+            <a:avLst/>
+          </a:prstGeom>
+        </p:spPr>
+      </p:pic>
+    </p:spTree>
+    <p:extLst>
+      <p:ext uri="{BB962C8B-B14F-4D97-AF65-F5344CB8AC3E}">
+        <p14:creationId xmlns:p14="http://schemas.microsoft.com/office/powerpoint/2010/main" val="1981053446"/>
+      </p:ext>
+    </p:extLst>
+  </p:cSld>
+  <p:clrMapOvr>
+    <a:masterClrMapping/>
+  </p:clrMapOvr>
+  <p:timing>
+    <p:tnLst>
+      <p:par>
+        <p:cTn id="1" dur="indefinite" restart="never" nodeType="tmRoot"/>
+      </p:par>
+    </p:tnLst>
+  </p:timing>
+</p:sld>
+</file>
+
+<file path=ppt/slides/slide7.xml><?xml version="1.0" encoding="utf-8"?>
+<p:sld xmlns:a="http://schemas.openxmlformats.org/drawingml/2006/main" xmlns:r="http://schemas.openxmlformats.org/officeDocument/2006/relationships" xmlns:p="http://schemas.openxmlformats.org/presentationml/2006/main">
+  <p:cSld>
+    <p:spTree>
+      <p:nvGrpSpPr>
+        <p:cNvPr id="1" name=""/>
+        <p:cNvGrpSpPr/>
+        <p:nvPr/>
+      </p:nvGrpSpPr>
+      <p:grpSpPr>
+        <a:xfrm>
+          <a:off x="0" y="0"/>
+          <a:ext cx="0" cy="0"/>
+          <a:chOff x="0" y="0"/>
+          <a:chExt cx="0" cy="0"/>
+        </a:xfrm>
+      </p:grpSpPr>
+      <p:sp>
+        <p:nvSpPr>
+          <p:cNvPr id="2" name="Title 1"/>
+          <p:cNvSpPr>
+            <a:spLocks noGrp="1"/>
+          </p:cNvSpPr>
+          <p:nvPr>
+            <p:ph type="title"/>
+          </p:nvPr>
+        </p:nvSpPr>
+        <p:spPr>
+          <a:xfrm>
+            <a:off x="677334" y="609600"/>
+            <a:ext cx="8596668" cy="850900"/>
+          </a:xfrm>
+        </p:spPr>
+        <p:txBody>
+          <a:bodyPr>
+            <a:normAutofit/>
+          </a:bodyPr>
+          <a:lstStyle/>
+          <a:p>
+            <a:r>
+              <a:rPr lang="en-US" sz="4400" dirty="0" err="1"/>
+              <a:t>Основни</a:t>
+            </a:r>
+            <a:r>
+              <a:rPr lang="en-US" sz="4400" dirty="0"/>
+              <a:t> </a:t>
+            </a:r>
+            <a:r>
+              <a:rPr lang="en-US" sz="4400" dirty="0" err="1"/>
+              <a:t>стъпки</a:t>
+            </a:r>
+            <a:r>
+              <a:rPr lang="en-US" sz="4400" dirty="0"/>
+              <a:t> в </a:t>
+            </a:r>
+            <a:r>
+              <a:rPr lang="en-US" sz="4400" dirty="0" smtClean="0"/>
+              <a:t>Agile</a:t>
+            </a:r>
+            <a:endParaRPr lang="en-US" sz="4400" dirty="0"/>
+          </a:p>
+        </p:txBody>
+      </p:sp>
+      <p:sp>
+        <p:nvSpPr>
+          <p:cNvPr id="3" name="Content Placeholder 2"/>
+          <p:cNvSpPr>
+            <a:spLocks noGrp="1"/>
+          </p:cNvSpPr>
+          <p:nvPr>
+            <p:ph idx="1"/>
+          </p:nvPr>
+        </p:nvSpPr>
+        <p:spPr>
+          <a:xfrm>
+            <a:off x="677334" y="1778001"/>
+            <a:ext cx="8596668" cy="4263362"/>
+          </a:xfrm>
+        </p:spPr>
+        <p:txBody>
+          <a:bodyPr/>
+          <a:lstStyle/>
+          <a:p>
+            <a:r>
+              <a:rPr lang="en-US" b="1" dirty="0" err="1" smtClean="0"/>
+              <a:t>Проучване</a:t>
+            </a:r>
+            <a:endParaRPr lang="bg-BG" b="1" dirty="0" smtClean="0"/>
+          </a:p>
+          <a:p>
+            <a:r>
+              <a:rPr lang="en-US" b="1" dirty="0"/>
+              <a:t>Product </a:t>
+            </a:r>
+            <a:r>
+              <a:rPr lang="en-US" b="1" dirty="0" smtClean="0"/>
+              <a:t>Backlog</a:t>
+            </a:r>
+            <a:endParaRPr lang="bg-BG" b="1" dirty="0" smtClean="0"/>
+          </a:p>
+          <a:p>
+            <a:r>
+              <a:rPr lang="bg-BG" b="1" dirty="0" smtClean="0"/>
+              <a:t>Работа</a:t>
+            </a:r>
+          </a:p>
+          <a:p>
+            <a:r>
+              <a:rPr lang="bg-BG" b="1" dirty="0" smtClean="0"/>
+              <a:t>Итерации</a:t>
+            </a:r>
+            <a:endParaRPr lang="en-US" b="1" dirty="0"/>
+          </a:p>
+          <a:p>
+            <a:endParaRPr lang="en-US" b="1" dirty="0"/>
+          </a:p>
+          <a:p>
+            <a:endParaRPr lang="bg-BG" b="1" dirty="0" smtClean="0"/>
+          </a:p>
+          <a:p>
+            <a:pPr marL="0" indent="0">
+              <a:buNone/>
+            </a:pPr>
+            <a:endParaRPr lang="en-US" b="1" dirty="0"/>
+          </a:p>
+          <a:p>
+            <a:pPr marL="0" indent="0">
+              <a:buNone/>
+            </a:pPr>
+            <a:endParaRPr lang="en-US" dirty="0"/>
+          </a:p>
+        </p:txBody>
+      </p:sp>
+      <p:pic>
+        <p:nvPicPr>
+          <p:cNvPr id="4" name="Picture 3"/>
+          <p:cNvPicPr>
+            <a:picLocks noChangeAspect="1"/>
+          </p:cNvPicPr>
+          <p:nvPr/>
+        </p:nvPicPr>
+        <p:blipFill>
+          <a:blip r:embed="rId2"/>
+          <a:stretch>
+            <a:fillRect/>
+          </a:stretch>
+        </p:blipFill>
+        <p:spPr>
+          <a:xfrm>
+            <a:off x="2984500" y="1601514"/>
+            <a:ext cx="5238635" cy="4616335"/>
+          </a:xfrm>
+          <a:prstGeom prst="rect">
+            <a:avLst/>
+          </a:prstGeom>
+        </p:spPr>
+      </p:pic>
+    </p:spTree>
+    <p:extLst>
+      <p:ext uri="{BB962C8B-B14F-4D97-AF65-F5344CB8AC3E}">
+        <p14:creationId xmlns:p14="http://schemas.microsoft.com/office/powerpoint/2010/main" val="3280382728"/>
+      </p:ext>
+    </p:extLst>
+  </p:cSld>
+  <p:clrMapOvr>
+    <a:masterClrMapping/>
+  </p:clrMapOvr>
+  <p:timing>
+    <p:tnLst>
+      <p:par>
+        <p:cTn id="1" dur="indefinite" restart="never" nodeType="tmRoot"/>
+      </p:par>
+    </p:tnLst>
+  </p:timing>
+</p:sld>
+</file>
+
+<file path=ppt/slides/slide8.xml><?xml version="1.0" encoding="utf-8"?>
+<p:sld xmlns:a="http://schemas.openxmlformats.org/drawingml/2006/main" xmlns:r="http://schemas.openxmlformats.org/officeDocument/2006/relationships" xmlns:p="http://schemas.openxmlformats.org/presentationml/2006/main">
+  <p:cSld>
+    <p:spTree>
+      <p:nvGrpSpPr>
+        <p:cNvPr id="1" name=""/>
+        <p:cNvGrpSpPr/>
+        <p:nvPr/>
+      </p:nvGrpSpPr>
+      <p:grpSpPr>
+        <a:xfrm>
+          <a:off x="0" y="0"/>
+          <a:ext cx="0" cy="0"/>
+          <a:chOff x="0" y="0"/>
+          <a:chExt cx="0" cy="0"/>
+        </a:xfrm>
+      </p:grpSpPr>
+      <p:sp>
+        <p:nvSpPr>
+          <p:cNvPr id="2" name="Title 1"/>
+          <p:cNvSpPr>
+            <a:spLocks noGrp="1"/>
+          </p:cNvSpPr>
+          <p:nvPr>
+            <p:ph type="title"/>
+          </p:nvPr>
+        </p:nvSpPr>
+        <p:spPr>
+          <a:xfrm>
+            <a:off x="677334" y="609600"/>
+            <a:ext cx="8596668" cy="876300"/>
+          </a:xfrm>
+        </p:spPr>
+        <p:txBody>
+          <a:bodyPr>
+            <a:normAutofit fontScale="90000"/>
+          </a:bodyPr>
+          <a:lstStyle/>
+          <a:p>
+            <a:r>
+              <a:rPr lang="en-US" sz="4400" dirty="0" smtClean="0"/>
+              <a:t>Agile vs Waterfall</a:t>
+            </a:r>
+            <a:r>
+              <a:rPr lang="en-US" dirty="0"/>
+              <a:t/>
+            </a:r>
+            <a:br>
+              <a:rPr lang="en-US" dirty="0"/>
+            </a:br>
+            <a:endParaRPr lang="en-US" dirty="0"/>
+          </a:p>
+        </p:txBody>
+      </p:sp>
+      <p:pic>
+        <p:nvPicPr>
+          <p:cNvPr id="4" name="Content Placeholder 3"/>
+          <p:cNvPicPr>
+            <a:picLocks noGrp="1" noChangeAspect="1"/>
+          </p:cNvPicPr>
+          <p:nvPr>
+            <p:ph idx="1"/>
+          </p:nvPr>
+        </p:nvPicPr>
+        <p:blipFill>
+          <a:blip r:embed="rId2"/>
+          <a:stretch>
+            <a:fillRect/>
+          </a:stretch>
+        </p:blipFill>
+        <p:spPr>
+          <a:xfrm>
+            <a:off x="520700" y="1485900"/>
+            <a:ext cx="7188200" cy="5131127"/>
+          </a:xfrm>
+          <a:prstGeom prst="rect">
+            <a:avLst/>
+          </a:prstGeom>
+        </p:spPr>
+      </p:pic>
+    </p:spTree>
+    <p:extLst>
+      <p:ext uri="{BB962C8B-B14F-4D97-AF65-F5344CB8AC3E}">
+        <p14:creationId xmlns:p14="http://schemas.microsoft.com/office/powerpoint/2010/main" val="1218742565"/>
+      </p:ext>
+    </p:extLst>
+  </p:cSld>
+  <p:clrMapOvr>
+    <a:masterClrMapping/>
+  </p:clrMapOvr>
+  <p:timing>
+    <p:tnLst>
+      <p:par>
+        <p:cTn id="1" dur="indefinite" restart="never" nodeType="tmRoot"/>
+      </p:par>
+    </p:tnLst>
+  </p:timing>
+</p:sld>
+</file>
+
+<file path=ppt/slides/slide9.xml><?xml version="1.0" encoding="utf-8"?>
+<p:sld xmlns:a="http://schemas.openxmlformats.org/drawingml/2006/main" xmlns:r="http://schemas.openxmlformats.org/officeDocument/2006/relationships" xmlns:p="http://schemas.openxmlformats.org/presentationml/2006/main">
+  <p:cSld>
+    <p:spTree>
+      <p:nvGrpSpPr>
+        <p:cNvPr id="1" name=""/>
+        <p:cNvGrpSpPr/>
+        <p:nvPr/>
+      </p:nvGrpSpPr>
+      <p:grpSpPr>
+        <a:xfrm>
+          <a:off x="0" y="0"/>
+          <a:ext cx="0" cy="0"/>
+          <a:chOff x="0" y="0"/>
+          <a:chExt cx="0" cy="0"/>
+        </a:xfrm>
+      </p:grpSpPr>
+      <p:sp>
+        <p:nvSpPr>
+          <p:cNvPr id="2" name="Title 1"/>
+          <p:cNvSpPr>
+            <a:spLocks noGrp="1"/>
+          </p:cNvSpPr>
+          <p:nvPr>
+            <p:ph type="title"/>
+          </p:nvPr>
+        </p:nvSpPr>
+        <p:spPr>
+          <a:xfrm>
+            <a:off x="677334" y="609600"/>
+            <a:ext cx="8596668" cy="838200"/>
+          </a:xfrm>
+        </p:spPr>
+        <p:txBody>
+          <a:bodyPr/>
+          <a:lstStyle/>
+          <a:p>
+            <a:r>
+              <a:rPr lang="bg-BG" sz="4000" dirty="0"/>
+              <a:t>Позли</a:t>
+            </a:r>
+            <a:r>
+              <a:rPr lang="bg-BG" dirty="0"/>
+              <a:t> от прилагане на </a:t>
+            </a:r>
+            <a:r>
+              <a:rPr lang="bg-BG" dirty="0" smtClean="0"/>
+              <a:t>Agile</a:t>
+            </a:r>
+            <a:endParaRPr lang="en-US" dirty="0"/>
+          </a:p>
+        </p:txBody>
+      </p:sp>
+      <p:sp>
+        <p:nvSpPr>
+          <p:cNvPr id="3" name="Content Placeholder 2"/>
+          <p:cNvSpPr>
+            <a:spLocks noGrp="1"/>
+          </p:cNvSpPr>
+          <p:nvPr>
+            <p:ph idx="1"/>
+          </p:nvPr>
+        </p:nvSpPr>
+        <p:spPr>
+          <a:xfrm>
+            <a:off x="677334" y="1689101"/>
+            <a:ext cx="8596668" cy="4352262"/>
+          </a:xfrm>
+        </p:spPr>
+        <p:txBody>
+          <a:bodyPr/>
+          <a:lstStyle/>
+          <a:p>
+            <a:r>
+              <a:rPr lang="en-US" sz="3600" dirty="0" err="1"/>
+              <a:t>Удовлетвореност</a:t>
+            </a:r>
+            <a:r>
+              <a:rPr lang="en-US" sz="3600" dirty="0"/>
+              <a:t> на </a:t>
+            </a:r>
+            <a:r>
+              <a:rPr lang="en-US" sz="3600" dirty="0" err="1"/>
+              <a:t>клиентите</a:t>
+            </a:r>
+            <a:endParaRPr lang="en-US" sz="3600" dirty="0"/>
+          </a:p>
+          <a:p>
+            <a:r>
+              <a:rPr lang="en-US" sz="3600" dirty="0" err="1"/>
+              <a:t>Контрол</a:t>
+            </a:r>
+            <a:r>
+              <a:rPr lang="en-US" sz="3600" dirty="0"/>
+              <a:t> и </a:t>
+            </a:r>
+            <a:r>
+              <a:rPr lang="en-US" sz="3600" dirty="0" err="1"/>
+              <a:t>прозрачност</a:t>
+            </a:r>
+            <a:endParaRPr lang="en-US" sz="3600" dirty="0"/>
+          </a:p>
+          <a:p>
+            <a:r>
+              <a:rPr lang="en-US" sz="3600" dirty="0" err="1"/>
+              <a:t>Предвидимост</a:t>
+            </a:r>
+            <a:r>
+              <a:rPr lang="en-US" sz="3600" dirty="0"/>
+              <a:t> и </a:t>
+            </a:r>
+            <a:r>
+              <a:rPr lang="en-US" sz="3600" dirty="0" err="1"/>
+              <a:t>намален</a:t>
+            </a:r>
+            <a:r>
+              <a:rPr lang="en-US" sz="3600" dirty="0"/>
+              <a:t> </a:t>
+            </a:r>
+            <a:r>
+              <a:rPr lang="en-US" sz="3600" dirty="0" err="1"/>
+              <a:t>риск</a:t>
+            </a:r>
+            <a:endParaRPr lang="en-US" sz="3600" dirty="0"/>
+          </a:p>
+          <a:p>
+            <a:r>
+              <a:rPr lang="en-US" sz="3600" dirty="0" err="1"/>
+              <a:t>Високо</a:t>
+            </a:r>
+            <a:r>
+              <a:rPr lang="en-US" sz="3600" dirty="0"/>
+              <a:t> </a:t>
+            </a:r>
+            <a:r>
+              <a:rPr lang="en-US" sz="3600" dirty="0" err="1"/>
+              <a:t>качество</a:t>
+            </a:r>
+            <a:endParaRPr lang="en-US" sz="3600" dirty="0"/>
+          </a:p>
+          <a:p>
+            <a:r>
+              <a:rPr lang="bg-BG" sz="3600" dirty="0"/>
+              <a:t>Фокусиране върху необходимостите на бизнеса</a:t>
+            </a:r>
+            <a:endParaRPr lang="en-US" sz="3600" dirty="0"/>
+          </a:p>
+          <a:p>
+            <a:endParaRPr lang="en-US" dirty="0"/>
+          </a:p>
+        </p:txBody>
+      </p:sp>
+    </p:spTree>
+    <p:extLst>
+      <p:ext uri="{BB962C8B-B14F-4D97-AF65-F5344CB8AC3E}">
+        <p14:creationId xmlns:p14="http://schemas.microsoft.com/office/powerpoint/2010/main" val="2424001227"/>
       </p:ext>
     </p:extLst>
   </p:cSld>

</xml_diff>

<commit_message>
added Scrum and Kanban
</commit_message>
<xml_diff>
--- a/Coursework - presentation.pptx
+++ b/Coursework - presentation.pptx
@@ -26,6 +26,13 @@
     <p:sldId id="274" r:id="rId20"/>
     <p:sldId id="275" r:id="rId21"/>
     <p:sldId id="276" r:id="rId22"/>
+    <p:sldId id="277" r:id="rId23"/>
+    <p:sldId id="279" r:id="rId24"/>
+    <p:sldId id="280" r:id="rId25"/>
+    <p:sldId id="281" r:id="rId26"/>
+    <p:sldId id="283" r:id="rId27"/>
+    <p:sldId id="284" r:id="rId28"/>
+    <p:sldId id="278" r:id="rId29"/>
   </p:sldIdLst>
   <p:sldSz cx="12192000" cy="6858000"/>
   <p:notesSz cx="6858000" cy="9144000"/>
@@ -126,7 +133,7 @@
   </p:defaultTextStyle>
   <p:extLst>
     <p:ext uri="{EFAFB233-063F-42B5-8137-9DF3F51BA10A}">
-      <p15:sldGuideLst xmlns:p15="http://schemas.microsoft.com/office/powerpoint/2012/main"/>
+      <p15:sldGuideLst xmlns:p15="http://schemas.microsoft.com/office/powerpoint/2012/main" xmlns=""/>
     </p:ext>
   </p:extLst>
 </p:presentation>
@@ -878,7 +885,7 @@
             <a:fld id="{B61BEF0D-F0BB-DE4B-95CE-6DB70DBA9567}" type="datetimeFigureOut">
               <a:rPr lang="en-US" dirty="0"/>
               <a:pPr/>
-              <a:t>12/8/2018</a:t>
+              <a:t>1/13/2019</a:t>
             </a:fld>
             <a:endParaRPr lang="en-US" dirty="0"/>
           </a:p>
@@ -1126,7 +1133,7 @@
             <a:fld id="{B61BEF0D-F0BB-DE4B-95CE-6DB70DBA9567}" type="datetimeFigureOut">
               <a:rPr lang="en-US" dirty="0"/>
               <a:pPr/>
-              <a:t>12/8/2018</a:t>
+              <a:t>1/13/2019</a:t>
             </a:fld>
             <a:endParaRPr lang="en-US" dirty="0"/>
           </a:p>
@@ -1437,7 +1444,7 @@
             <a:fld id="{B61BEF0D-F0BB-DE4B-95CE-6DB70DBA9567}" type="datetimeFigureOut">
               <a:rPr lang="en-US" dirty="0"/>
               <a:pPr/>
-              <a:t>12/8/2018</a:t>
+              <a:t>1/13/2019</a:t>
             </a:fld>
             <a:endParaRPr lang="en-US" dirty="0"/>
           </a:p>
@@ -1767,7 +1774,7 @@
             <a:fld id="{B61BEF0D-F0BB-DE4B-95CE-6DB70DBA9567}" type="datetimeFigureOut">
               <a:rPr lang="en-US" dirty="0"/>
               <a:pPr/>
-              <a:t>12/8/2018</a:t>
+              <a:t>1/13/2019</a:t>
             </a:fld>
             <a:endParaRPr lang="en-US" dirty="0"/>
           </a:p>
@@ -2078,7 +2085,7 @@
             <a:fld id="{B61BEF0D-F0BB-DE4B-95CE-6DB70DBA9567}" type="datetimeFigureOut">
               <a:rPr lang="en-US" dirty="0"/>
               <a:pPr/>
-              <a:t>12/8/2018</a:t>
+              <a:t>1/13/2019</a:t>
             </a:fld>
             <a:endParaRPr lang="en-US" dirty="0"/>
           </a:p>
@@ -2468,7 +2475,7 @@
             <a:fld id="{B61BEF0D-F0BB-DE4B-95CE-6DB70DBA9567}" type="datetimeFigureOut">
               <a:rPr lang="en-US" dirty="0"/>
               <a:pPr/>
-              <a:t>12/8/2018</a:t>
+              <a:t>1/13/2019</a:t>
             </a:fld>
             <a:endParaRPr lang="en-US" dirty="0"/>
           </a:p>
@@ -2634,7 +2641,7 @@
           <a:p>
             <a:fld id="{55C6B4A9-1611-4792-9094-5F34BCA07E0B}" type="datetimeFigureOut">
               <a:rPr lang="en-US" dirty="0"/>
-              <a:t>12/8/2018</a:t>
+              <a:t>1/13/2019</a:t>
             </a:fld>
             <a:endParaRPr lang="en-US" dirty="0"/>
           </a:p>
@@ -2810,7 +2817,7 @@
             <a:fld id="{B61BEF0D-F0BB-DE4B-95CE-6DB70DBA9567}" type="datetimeFigureOut">
               <a:rPr lang="en-US" dirty="0"/>
               <a:pPr/>
-              <a:t>12/8/2018</a:t>
+              <a:t>1/13/2019</a:t>
             </a:fld>
             <a:endParaRPr lang="en-US" dirty="0"/>
           </a:p>
@@ -2976,7 +2983,7 @@
           <a:p>
             <a:fld id="{42A54C80-263E-416B-A8E0-580EDEADCBDC}" type="datetimeFigureOut">
               <a:rPr lang="en-US" dirty="0"/>
-              <a:t>12/8/2018</a:t>
+              <a:t>1/13/2019</a:t>
             </a:fld>
             <a:endParaRPr lang="en-US" dirty="0"/>
           </a:p>
@@ -3219,7 +3226,7 @@
             <a:fld id="{B61BEF0D-F0BB-DE4B-95CE-6DB70DBA9567}" type="datetimeFigureOut">
               <a:rPr lang="en-US" dirty="0"/>
               <a:pPr/>
-              <a:t>12/8/2018</a:t>
+              <a:t>1/13/2019</a:t>
             </a:fld>
             <a:endParaRPr lang="en-US" dirty="0"/>
           </a:p>
@@ -3447,7 +3454,7 @@
           <a:p>
             <a:fld id="{42A54C80-263E-416B-A8E0-580EDEADCBDC}" type="datetimeFigureOut">
               <a:rPr lang="en-US" dirty="0"/>
-              <a:t>12/8/2018</a:t>
+              <a:t>1/13/2019</a:t>
             </a:fld>
             <a:endParaRPr lang="en-US" dirty="0"/>
           </a:p>
@@ -3817,7 +3824,7 @@
             <a:fld id="{B61BEF0D-F0BB-DE4B-95CE-6DB70DBA9567}" type="datetimeFigureOut">
               <a:rPr lang="en-US" dirty="0"/>
               <a:pPr/>
-              <a:t>12/8/2018</a:t>
+              <a:t>1/13/2019</a:t>
             </a:fld>
             <a:endParaRPr lang="en-US" dirty="0"/>
           </a:p>
@@ -3937,7 +3944,7 @@
             <a:fld id="{B61BEF0D-F0BB-DE4B-95CE-6DB70DBA9567}" type="datetimeFigureOut">
               <a:rPr lang="en-US" dirty="0"/>
               <a:pPr/>
-              <a:t>12/8/2018</a:t>
+              <a:t>1/13/2019</a:t>
             </a:fld>
             <a:endParaRPr lang="en-US" dirty="0"/>
           </a:p>
@@ -4029,7 +4036,7 @@
             <a:fld id="{B61BEF0D-F0BB-DE4B-95CE-6DB70DBA9567}" type="datetimeFigureOut">
               <a:rPr lang="en-US" dirty="0"/>
               <a:pPr/>
-              <a:t>12/8/2018</a:t>
+              <a:t>1/13/2019</a:t>
             </a:fld>
             <a:endParaRPr lang="en-US" dirty="0"/>
           </a:p>
@@ -4280,7 +4287,7 @@
           <a:p>
             <a:fld id="{42A54C80-263E-416B-A8E0-580EDEADCBDC}" type="datetimeFigureOut">
               <a:rPr lang="en-US" dirty="0"/>
-              <a:t>12/8/2018</a:t>
+              <a:t>1/13/2019</a:t>
             </a:fld>
             <a:endParaRPr lang="en-US" dirty="0"/>
           </a:p>
@@ -4582,7 +4589,7 @@
             <a:fld id="{B61BEF0D-F0BB-DE4B-95CE-6DB70DBA9567}" type="datetimeFigureOut">
               <a:rPr lang="en-US" dirty="0"/>
               <a:pPr/>
-              <a:t>12/8/2018</a:t>
+              <a:t>1/13/2019</a:t>
             </a:fld>
             <a:endParaRPr lang="en-US" dirty="0"/>
           </a:p>
@@ -5280,7 +5287,7 @@
             <a:fld id="{B61BEF0D-F0BB-DE4B-95CE-6DB70DBA9567}" type="datetimeFigureOut">
               <a:rPr lang="en-US" dirty="0"/>
               <a:pPr/>
-              <a:t>12/8/2018</a:t>
+              <a:t>1/13/2019</a:t>
             </a:fld>
             <a:endParaRPr lang="en-US" dirty="0"/>
           </a:p>
@@ -7205,11 +7212,7 @@
           <a:p>
             <a:r>
               <a:rPr lang="bg-BG" sz="3600" dirty="0"/>
-              <a:t>Позли от прилагане на </a:t>
-            </a:r>
-            <a:r>
-              <a:rPr lang="bg-BG" sz="3600" dirty="0"/>
-              <a:t>Agile</a:t>
+              <a:t>Позли от прилагане на Agile</a:t>
             </a:r>
             <a:endParaRPr lang="en-US" sz="3600" dirty="0"/>
           </a:p>
@@ -7522,6 +7525,1389 @@
       </p:par>
     </p:tnLst>
   </p:timing>
+</p:sld>
+</file>
+
+<file path=ppt/slides/slide22.xml><?xml version="1.0" encoding="utf-8"?>
+<p:sld xmlns:a="http://schemas.openxmlformats.org/drawingml/2006/main" xmlns:r="http://schemas.openxmlformats.org/officeDocument/2006/relationships" xmlns:p="http://schemas.openxmlformats.org/presentationml/2006/main">
+  <p:cSld>
+    <p:spTree>
+      <p:nvGrpSpPr>
+        <p:cNvPr id="1" name=""/>
+        <p:cNvGrpSpPr/>
+        <p:nvPr/>
+      </p:nvGrpSpPr>
+      <p:grpSpPr>
+        <a:xfrm>
+          <a:off x="0" y="0"/>
+          <a:ext cx="0" cy="0"/>
+          <a:chOff x="0" y="0"/>
+          <a:chExt cx="0" cy="0"/>
+        </a:xfrm>
+      </p:grpSpPr>
+      <p:sp>
+        <p:nvSpPr>
+          <p:cNvPr id="2" name="Title 1"/>
+          <p:cNvSpPr>
+            <a:spLocks noGrp="1"/>
+          </p:cNvSpPr>
+          <p:nvPr>
+            <p:ph type="title"/>
+          </p:nvPr>
+        </p:nvSpPr>
+        <p:spPr/>
+        <p:txBody>
+          <a:bodyPr/>
+          <a:lstStyle/>
+          <a:p>
+            <a:r>
+              <a:rPr lang="bg-BG" dirty="0" smtClean="0"/>
+              <a:t>Популярни </a:t>
+            </a:r>
+            <a:r>
+              <a:rPr lang="en-US" dirty="0" smtClean="0"/>
+              <a:t>Agile </a:t>
+            </a:r>
+            <a:r>
+              <a:rPr lang="bg-BG" dirty="0" smtClean="0"/>
+              <a:t>Методологии</a:t>
+            </a:r>
+            <a:endParaRPr lang="bg-BG" dirty="0"/>
+          </a:p>
+        </p:txBody>
+      </p:sp>
+      <p:sp>
+        <p:nvSpPr>
+          <p:cNvPr id="3" name="Content Placeholder 2"/>
+          <p:cNvSpPr>
+            <a:spLocks noGrp="1"/>
+          </p:cNvSpPr>
+          <p:nvPr>
+            <p:ph sz="half" idx="1"/>
+          </p:nvPr>
+        </p:nvSpPr>
+        <p:spPr>
+          <a:xfrm>
+            <a:off x="677334" y="2160589"/>
+            <a:ext cx="9168002" cy="3880772"/>
+          </a:xfrm>
+        </p:spPr>
+        <p:txBody>
+          <a:bodyPr>
+            <a:normAutofit/>
+          </a:bodyPr>
+          <a:lstStyle/>
+          <a:p>
+            <a:pPr>
+              <a:buFont typeface="Arial" pitchFamily="34" charset="0"/>
+              <a:buChar char="•"/>
+            </a:pPr>
+            <a:r>
+              <a:rPr lang="en-US" sz="3600" dirty="0" smtClean="0"/>
+              <a:t>Scrum</a:t>
+            </a:r>
+          </a:p>
+          <a:p>
+            <a:pPr>
+              <a:buFont typeface="Arial" pitchFamily="34" charset="0"/>
+              <a:buChar char="•"/>
+            </a:pPr>
+            <a:r>
+              <a:rPr lang="en-US" sz="3600" dirty="0" err="1" smtClean="0"/>
+              <a:t>Kanban</a:t>
+            </a:r>
+            <a:endParaRPr lang="en-US" sz="3600" dirty="0" smtClean="0"/>
+          </a:p>
+          <a:p>
+            <a:pPr>
+              <a:buFont typeface="Arial" pitchFamily="34" charset="0"/>
+              <a:buChar char="•"/>
+            </a:pPr>
+            <a:r>
+              <a:rPr lang="en-US" sz="3600" dirty="0" smtClean="0"/>
+              <a:t>Extreme Programming (XP)</a:t>
+            </a:r>
+            <a:endParaRPr lang="bg-BG" sz="3600" dirty="0"/>
+          </a:p>
+        </p:txBody>
+      </p:sp>
+    </p:spTree>
+    <p:extLst>
+      <p:ext uri="{BB962C8B-B14F-4D97-AF65-F5344CB8AC3E}">
+        <p14:creationId xmlns:p14="http://schemas.microsoft.com/office/powerpoint/2010/main" val="1915782828"/>
+      </p:ext>
+    </p:extLst>
+  </p:cSld>
+  <p:clrMapOvr>
+    <a:masterClrMapping/>
+  </p:clrMapOvr>
+</p:sld>
+</file>
+
+<file path=ppt/slides/slide23.xml><?xml version="1.0" encoding="utf-8"?>
+<p:sld xmlns:a="http://schemas.openxmlformats.org/drawingml/2006/main" xmlns:r="http://schemas.openxmlformats.org/officeDocument/2006/relationships" xmlns:p="http://schemas.openxmlformats.org/presentationml/2006/main">
+  <p:cSld>
+    <p:spTree>
+      <p:nvGrpSpPr>
+        <p:cNvPr id="1" name=""/>
+        <p:cNvGrpSpPr/>
+        <p:nvPr/>
+      </p:nvGrpSpPr>
+      <p:grpSpPr>
+        <a:xfrm>
+          <a:off x="0" y="0"/>
+          <a:ext cx="0" cy="0"/>
+          <a:chOff x="0" y="0"/>
+          <a:chExt cx="0" cy="0"/>
+        </a:xfrm>
+      </p:grpSpPr>
+      <p:sp>
+        <p:nvSpPr>
+          <p:cNvPr id="2" name="Title 1"/>
+          <p:cNvSpPr>
+            <a:spLocks noGrp="1"/>
+          </p:cNvSpPr>
+          <p:nvPr>
+            <p:ph type="title"/>
+          </p:nvPr>
+        </p:nvSpPr>
+        <p:spPr/>
+        <p:txBody>
+          <a:bodyPr/>
+          <a:lstStyle/>
+          <a:p>
+            <a:r>
+              <a:rPr lang="en-US" dirty="0" smtClean="0"/>
+              <a:t>Scrum</a:t>
+            </a:r>
+            <a:endParaRPr lang="bg-BG" dirty="0"/>
+          </a:p>
+        </p:txBody>
+      </p:sp>
+      <p:pic>
+        <p:nvPicPr>
+          <p:cNvPr id="5" name="Content Placeholder 4"/>
+          <p:cNvPicPr>
+            <a:picLocks noGrp="1" noChangeAspect="1"/>
+          </p:cNvPicPr>
+          <p:nvPr>
+            <p:ph sz="half" idx="1"/>
+          </p:nvPr>
+        </p:nvPicPr>
+        <p:blipFill>
+          <a:blip r:embed="rId2">
+            <a:extLst>
+              <a:ext uri="{28A0092B-C50C-407E-A947-70E740481C1C}">
+                <a14:useLocalDpi xmlns:a14="http://schemas.microsoft.com/office/drawing/2010/main" val="0"/>
+              </a:ext>
+            </a:extLst>
+          </a:blip>
+          <a:stretch>
+            <a:fillRect/>
+          </a:stretch>
+        </p:blipFill>
+        <p:spPr>
+          <a:xfrm>
+            <a:off x="651230" y="1300206"/>
+            <a:ext cx="8892266" cy="5001898"/>
+          </a:xfrm>
+        </p:spPr>
+      </p:pic>
+    </p:spTree>
+    <p:extLst>
+      <p:ext uri="{BB962C8B-B14F-4D97-AF65-F5344CB8AC3E}">
+        <p14:creationId xmlns:p14="http://schemas.microsoft.com/office/powerpoint/2010/main" val="3254800332"/>
+      </p:ext>
+    </p:extLst>
+  </p:cSld>
+  <p:clrMapOvr>
+    <a:masterClrMapping/>
+  </p:clrMapOvr>
+</p:sld>
+</file>
+
+<file path=ppt/slides/slide24.xml><?xml version="1.0" encoding="utf-8"?>
+<p:sld xmlns:a="http://schemas.openxmlformats.org/drawingml/2006/main" xmlns:r="http://schemas.openxmlformats.org/officeDocument/2006/relationships" xmlns:p="http://schemas.openxmlformats.org/presentationml/2006/main">
+  <p:cSld>
+    <p:spTree>
+      <p:nvGrpSpPr>
+        <p:cNvPr id="1" name=""/>
+        <p:cNvGrpSpPr/>
+        <p:nvPr/>
+      </p:nvGrpSpPr>
+      <p:grpSpPr>
+        <a:xfrm>
+          <a:off x="0" y="0"/>
+          <a:ext cx="0" cy="0"/>
+          <a:chOff x="0" y="0"/>
+          <a:chExt cx="0" cy="0"/>
+        </a:xfrm>
+      </p:grpSpPr>
+      <p:sp>
+        <p:nvSpPr>
+          <p:cNvPr id="2" name="Title 1"/>
+          <p:cNvSpPr>
+            <a:spLocks noGrp="1"/>
+          </p:cNvSpPr>
+          <p:nvPr>
+            <p:ph type="title"/>
+          </p:nvPr>
+        </p:nvSpPr>
+        <p:spPr>
+          <a:xfrm>
+            <a:off x="650701" y="316636"/>
+            <a:ext cx="8596668" cy="1320800"/>
+          </a:xfrm>
+        </p:spPr>
+        <p:txBody>
+          <a:bodyPr/>
+          <a:lstStyle/>
+          <a:p>
+            <a:r>
+              <a:rPr lang="en-US" dirty="0" smtClean="0"/>
+              <a:t>Scrum </a:t>
+            </a:r>
+            <a:r>
+              <a:rPr lang="bg-BG" dirty="0" smtClean="0"/>
+              <a:t>роли</a:t>
+            </a:r>
+            <a:endParaRPr lang="bg-BG" dirty="0"/>
+          </a:p>
+        </p:txBody>
+      </p:sp>
+      <p:pic>
+        <p:nvPicPr>
+          <p:cNvPr id="5" name="Content Placeholder 4"/>
+          <p:cNvPicPr>
+            <a:picLocks noGrp="1" noChangeAspect="1"/>
+          </p:cNvPicPr>
+          <p:nvPr>
+            <p:ph sz="half" idx="1"/>
+          </p:nvPr>
+        </p:nvPicPr>
+        <p:blipFill>
+          <a:blip r:embed="rId2">
+            <a:extLst>
+              <a:ext uri="{28A0092B-C50C-407E-A947-70E740481C1C}">
+                <a14:useLocalDpi xmlns:a14="http://schemas.microsoft.com/office/drawing/2010/main" val="0"/>
+              </a:ext>
+            </a:extLst>
+          </a:blip>
+          <a:stretch>
+            <a:fillRect/>
+          </a:stretch>
+        </p:blipFill>
+        <p:spPr>
+          <a:xfrm>
+            <a:off x="1216956" y="1358348"/>
+            <a:ext cx="8326539" cy="4683678"/>
+          </a:xfrm>
+        </p:spPr>
+      </p:pic>
+    </p:spTree>
+    <p:extLst>
+      <p:ext uri="{BB962C8B-B14F-4D97-AF65-F5344CB8AC3E}">
+        <p14:creationId xmlns:p14="http://schemas.microsoft.com/office/powerpoint/2010/main" val="994848817"/>
+      </p:ext>
+    </p:extLst>
+  </p:cSld>
+  <p:clrMapOvr>
+    <a:masterClrMapping/>
+  </p:clrMapOvr>
+</p:sld>
+</file>
+
+<file path=ppt/slides/slide25.xml><?xml version="1.0" encoding="utf-8"?>
+<p:sld xmlns:a="http://schemas.openxmlformats.org/drawingml/2006/main" xmlns:r="http://schemas.openxmlformats.org/officeDocument/2006/relationships" xmlns:p="http://schemas.openxmlformats.org/presentationml/2006/main">
+  <p:cSld>
+    <p:spTree>
+      <p:nvGrpSpPr>
+        <p:cNvPr id="1" name=""/>
+        <p:cNvGrpSpPr/>
+        <p:nvPr/>
+      </p:nvGrpSpPr>
+      <p:grpSpPr>
+        <a:xfrm>
+          <a:off x="0" y="0"/>
+          <a:ext cx="0" cy="0"/>
+          <a:chOff x="0" y="0"/>
+          <a:chExt cx="0" cy="0"/>
+        </a:xfrm>
+      </p:grpSpPr>
+      <p:sp>
+        <p:nvSpPr>
+          <p:cNvPr id="2" name="Title 1"/>
+          <p:cNvSpPr>
+            <a:spLocks noGrp="1"/>
+          </p:cNvSpPr>
+          <p:nvPr>
+            <p:ph type="title"/>
+          </p:nvPr>
+        </p:nvSpPr>
+        <p:spPr/>
+        <p:txBody>
+          <a:bodyPr/>
+          <a:lstStyle/>
+          <a:p>
+            <a:r>
+              <a:rPr lang="en-US" dirty="0" err="1" smtClean="0"/>
+              <a:t>Kanban</a:t>
+            </a:r>
+            <a:endParaRPr lang="bg-BG" dirty="0"/>
+          </a:p>
+        </p:txBody>
+      </p:sp>
+      <p:pic>
+        <p:nvPicPr>
+          <p:cNvPr id="5" name="Content Placeholder 4"/>
+          <p:cNvPicPr>
+            <a:picLocks noGrp="1" noChangeAspect="1"/>
+          </p:cNvPicPr>
+          <p:nvPr>
+            <p:ph sz="half" idx="1"/>
+          </p:nvPr>
+        </p:nvPicPr>
+        <p:blipFill>
+          <a:blip r:embed="rId2">
+            <a:extLst>
+              <a:ext uri="{28A0092B-C50C-407E-A947-70E740481C1C}">
+                <a14:useLocalDpi xmlns:a14="http://schemas.microsoft.com/office/drawing/2010/main" val="0"/>
+              </a:ext>
+            </a:extLst>
+          </a:blip>
+          <a:stretch>
+            <a:fillRect/>
+          </a:stretch>
+        </p:blipFill>
+        <p:spPr>
+          <a:xfrm>
+            <a:off x="1414709" y="1412066"/>
+            <a:ext cx="6086922" cy="5042000"/>
+          </a:xfrm>
+        </p:spPr>
+      </p:pic>
+    </p:spTree>
+    <p:extLst>
+      <p:ext uri="{BB962C8B-B14F-4D97-AF65-F5344CB8AC3E}">
+        <p14:creationId xmlns:p14="http://schemas.microsoft.com/office/powerpoint/2010/main" val="464132041"/>
+      </p:ext>
+    </p:extLst>
+  </p:cSld>
+  <p:clrMapOvr>
+    <a:masterClrMapping/>
+  </p:clrMapOvr>
+</p:sld>
+</file>
+
+<file path=ppt/slides/slide26.xml><?xml version="1.0" encoding="utf-8"?>
+<p:sld xmlns:a="http://schemas.openxmlformats.org/drawingml/2006/main" xmlns:r="http://schemas.openxmlformats.org/officeDocument/2006/relationships" xmlns:p="http://schemas.openxmlformats.org/presentationml/2006/main">
+  <p:cSld>
+    <p:spTree>
+      <p:nvGrpSpPr>
+        <p:cNvPr id="1" name=""/>
+        <p:cNvGrpSpPr/>
+        <p:nvPr/>
+      </p:nvGrpSpPr>
+      <p:grpSpPr>
+        <a:xfrm>
+          <a:off x="0" y="0"/>
+          <a:ext cx="0" cy="0"/>
+          <a:chOff x="0" y="0"/>
+          <a:chExt cx="0" cy="0"/>
+        </a:xfrm>
+      </p:grpSpPr>
+      <p:graphicFrame>
+        <p:nvGraphicFramePr>
+          <p:cNvPr id="5" name="Content Placeholder 4"/>
+          <p:cNvGraphicFramePr>
+            <a:graphicFrameLocks noGrp="1"/>
+          </p:cNvGraphicFramePr>
+          <p:nvPr>
+            <p:ph sz="half" idx="1"/>
+            <p:extLst>
+              <p:ext uri="{D42A27DB-BD31-4B8C-83A1-F6EECF244321}">
+                <p14:modId xmlns:p14="http://schemas.microsoft.com/office/powerpoint/2010/main" val="510891986"/>
+              </p:ext>
+            </p:extLst>
+          </p:nvPr>
+        </p:nvGraphicFramePr>
+        <p:xfrm>
+          <a:off x="1091952" y="506027"/>
+          <a:ext cx="7448364" cy="5465094"/>
+        </p:xfrm>
+        <a:graphic>
+          <a:graphicData uri="http://schemas.openxmlformats.org/drawingml/2006/table">
+            <a:tbl>
+              <a:tblPr firstRow="1" bandRow="1">
+                <a:tableStyleId>{5C22544A-7EE6-4342-B048-85BDC9FD1C3A}</a:tableStyleId>
+              </a:tblPr>
+              <a:tblGrid>
+                <a:gridCol w="3724182"/>
+                <a:gridCol w="3724182"/>
+              </a:tblGrid>
+              <a:tr h="710214">
+                <a:tc>
+                  <a:txBody>
+                    <a:bodyPr/>
+                    <a:lstStyle/>
+                    <a:p>
+                      <a:r>
+                        <a:rPr lang="en-US" sz="3600" dirty="0" err="1" smtClean="0"/>
+                        <a:t>Kanban</a:t>
+                      </a:r>
+                      <a:endParaRPr lang="bg-BG" sz="3600" dirty="0"/>
+                    </a:p>
+                  </a:txBody>
+                  <a:tcPr/>
+                </a:tc>
+                <a:tc>
+                  <a:txBody>
+                    <a:bodyPr/>
+                    <a:lstStyle/>
+                    <a:p>
+                      <a:r>
+                        <a:rPr lang="en-US" sz="3600" dirty="0" smtClean="0"/>
+                        <a:t>Scrum</a:t>
+                      </a:r>
+                      <a:endParaRPr lang="bg-BG" sz="3600" dirty="0"/>
+                    </a:p>
+                  </a:txBody>
+                  <a:tcPr/>
+                </a:tc>
+              </a:tr>
+              <a:tr h="710214">
+                <a:tc>
+                  <a:txBody>
+                    <a:bodyPr/>
+                    <a:lstStyle/>
+                    <a:p>
+                      <a:pPr marL="0" marR="0" indent="0" algn="l" defTabSz="457200" rtl="0" eaLnBrk="1" fontAlgn="auto" latinLnBrk="0" hangingPunct="1">
+                        <a:lnSpc>
+                          <a:spcPct val="100000"/>
+                        </a:lnSpc>
+                        <a:spcBef>
+                          <a:spcPts val="0"/>
+                        </a:spcBef>
+                        <a:spcAft>
+                          <a:spcPts val="0"/>
+                        </a:spcAft>
+                        <a:buClrTx/>
+                        <a:buSzTx/>
+                        <a:buFontTx/>
+                        <a:buNone/>
+                        <a:tabLst/>
+                        <a:defRPr/>
+                      </a:pPr>
+                      <a:r>
+                        <a:rPr lang="bg-BG" dirty="0" smtClean="0"/>
+                        <a:t>П</a:t>
+                      </a:r>
+                      <a:r>
+                        <a:rPr lang="en-US" dirty="0" err="1" smtClean="0"/>
+                        <a:t>одход</a:t>
+                      </a:r>
+                      <a:r>
+                        <a:rPr lang="en-US" dirty="0" smtClean="0"/>
+                        <a:t> </a:t>
+                      </a:r>
+                      <a:r>
+                        <a:rPr lang="en-US" dirty="0" err="1" smtClean="0"/>
+                        <a:t>за</a:t>
+                      </a:r>
+                      <a:r>
+                        <a:rPr lang="en-US" dirty="0" smtClean="0"/>
+                        <a:t> </a:t>
+                      </a:r>
+                      <a:r>
+                        <a:rPr lang="en-US" dirty="0" err="1" smtClean="0"/>
+                        <a:t>подобряване</a:t>
+                      </a:r>
+                      <a:endParaRPr lang="en-US" dirty="0" smtClean="0"/>
+                    </a:p>
+                  </a:txBody>
+                  <a:tcPr/>
+                </a:tc>
+                <a:tc>
+                  <a:txBody>
+                    <a:bodyPr/>
+                    <a:lstStyle/>
+                    <a:p>
+                      <a:pPr marL="0" marR="0" indent="0" algn="l" defTabSz="457200" rtl="0" eaLnBrk="1" fontAlgn="auto" latinLnBrk="0" hangingPunct="1">
+                        <a:lnSpc>
+                          <a:spcPct val="100000"/>
+                        </a:lnSpc>
+                        <a:spcBef>
+                          <a:spcPts val="0"/>
+                        </a:spcBef>
+                        <a:spcAft>
+                          <a:spcPts val="0"/>
+                        </a:spcAft>
+                        <a:buClrTx/>
+                        <a:buSzTx/>
+                        <a:buFontTx/>
+                        <a:buNone/>
+                        <a:tabLst/>
+                        <a:defRPr/>
+                      </a:pPr>
+                      <a:r>
+                        <a:rPr lang="bg-BG" dirty="0" smtClean="0"/>
+                        <a:t>П</a:t>
+                      </a:r>
+                      <a:r>
+                        <a:rPr lang="en-US" dirty="0" err="1" smtClean="0"/>
+                        <a:t>одход</a:t>
+                      </a:r>
+                      <a:r>
+                        <a:rPr lang="en-US" dirty="0" smtClean="0"/>
+                        <a:t> </a:t>
+                      </a:r>
+                      <a:r>
+                        <a:rPr lang="en-US" dirty="0" err="1" smtClean="0"/>
+                        <a:t>към</a:t>
+                      </a:r>
+                      <a:r>
+                        <a:rPr lang="en-US" dirty="0" smtClean="0"/>
+                        <a:t> </a:t>
+                      </a:r>
+                      <a:r>
+                        <a:rPr lang="en-US" dirty="0" err="1" smtClean="0"/>
+                        <a:t>комплексното</a:t>
+                      </a:r>
+                      <a:r>
+                        <a:rPr lang="en-US" dirty="0" smtClean="0"/>
+                        <a:t> </a:t>
+                      </a:r>
+                      <a:r>
+                        <a:rPr lang="en-US" dirty="0" err="1" smtClean="0"/>
+                        <a:t>разработване</a:t>
+                      </a:r>
+                      <a:endParaRPr lang="bg-BG" dirty="0" smtClean="0"/>
+                    </a:p>
+                    <a:p>
+                      <a:endParaRPr lang="bg-BG" dirty="0"/>
+                    </a:p>
+                  </a:txBody>
+                  <a:tcPr/>
+                </a:tc>
+              </a:tr>
+              <a:tr h="710214">
+                <a:tc>
+                  <a:txBody>
+                    <a:bodyPr/>
+                    <a:lstStyle/>
+                    <a:p>
+                      <a:pPr marL="0" marR="0" indent="0" algn="l" defTabSz="457200" rtl="0" eaLnBrk="1" fontAlgn="auto" latinLnBrk="0" hangingPunct="1">
+                        <a:lnSpc>
+                          <a:spcPct val="100000"/>
+                        </a:lnSpc>
+                        <a:spcBef>
+                          <a:spcPts val="0"/>
+                        </a:spcBef>
+                        <a:spcAft>
+                          <a:spcPts val="0"/>
+                        </a:spcAft>
+                        <a:buClrTx/>
+                        <a:buSzTx/>
+                        <a:buFontTx/>
+                        <a:buNone/>
+                        <a:tabLst/>
+                        <a:defRPr/>
+                      </a:pPr>
+                      <a:r>
+                        <a:rPr lang="bg-BG" dirty="0" smtClean="0"/>
+                        <a:t>Няма роли и процеси</a:t>
+                      </a:r>
+                    </a:p>
+                    <a:p>
+                      <a:endParaRPr lang="bg-BG" dirty="0"/>
+                    </a:p>
+                  </a:txBody>
+                  <a:tcPr/>
+                </a:tc>
+                <a:tc>
+                  <a:txBody>
+                    <a:bodyPr/>
+                    <a:lstStyle/>
+                    <a:p>
+                      <a:pPr marL="0" marR="0" indent="0" algn="l" defTabSz="457200" rtl="0" eaLnBrk="1" fontAlgn="auto" latinLnBrk="0" hangingPunct="1">
+                        <a:lnSpc>
+                          <a:spcPct val="100000"/>
+                        </a:lnSpc>
+                        <a:spcBef>
+                          <a:spcPts val="0"/>
+                        </a:spcBef>
+                        <a:spcAft>
+                          <a:spcPts val="0"/>
+                        </a:spcAft>
+                        <a:buClrTx/>
+                        <a:buSzTx/>
+                        <a:buFontTx/>
+                        <a:buNone/>
+                        <a:tabLst/>
+                        <a:defRPr/>
+                      </a:pPr>
+                      <a:r>
+                        <a:rPr lang="bg-BG" dirty="0" smtClean="0"/>
+                        <a:t>Я</a:t>
+                      </a:r>
+                      <a:r>
+                        <a:rPr lang="en-US" dirty="0" err="1" smtClean="0"/>
+                        <a:t>сно</a:t>
+                      </a:r>
+                      <a:r>
+                        <a:rPr lang="en-US" dirty="0" smtClean="0"/>
+                        <a:t> </a:t>
+                      </a:r>
+                      <a:r>
+                        <a:rPr lang="en-US" dirty="0" err="1" smtClean="0"/>
+                        <a:t>дефинирани</a:t>
+                      </a:r>
+                      <a:r>
+                        <a:rPr lang="en-US" dirty="0" smtClean="0"/>
+                        <a:t> </a:t>
+                      </a:r>
+                      <a:r>
+                        <a:rPr lang="en-US" dirty="0" err="1" smtClean="0"/>
+                        <a:t>роли</a:t>
+                      </a:r>
+                      <a:r>
+                        <a:rPr lang="en-US" dirty="0" smtClean="0"/>
+                        <a:t> и </a:t>
+                      </a:r>
+                      <a:r>
+                        <a:rPr lang="en-US" dirty="0" err="1" smtClean="0"/>
+                        <a:t>процеси</a:t>
+                      </a:r>
+                      <a:endParaRPr lang="bg-BG" dirty="0" smtClean="0"/>
+                    </a:p>
+                    <a:p>
+                      <a:endParaRPr lang="bg-BG" dirty="0"/>
+                    </a:p>
+                  </a:txBody>
+                  <a:tcPr/>
+                </a:tc>
+              </a:tr>
+              <a:tr h="710214">
+                <a:tc>
+                  <a:txBody>
+                    <a:bodyPr/>
+                    <a:lstStyle/>
+                    <a:p>
+                      <a:pPr marL="0" marR="0" indent="0" algn="l" defTabSz="457200" rtl="0" eaLnBrk="1" fontAlgn="auto" latinLnBrk="0" hangingPunct="1">
+                        <a:lnSpc>
+                          <a:spcPct val="100000"/>
+                        </a:lnSpc>
+                        <a:spcBef>
+                          <a:spcPts val="0"/>
+                        </a:spcBef>
+                        <a:spcAft>
+                          <a:spcPts val="0"/>
+                        </a:spcAft>
+                        <a:buClrTx/>
+                        <a:buSzTx/>
+                        <a:buFontTx/>
+                        <a:buNone/>
+                        <a:tabLst/>
+                        <a:defRPr/>
+                      </a:pPr>
+                      <a:r>
+                        <a:rPr lang="en-US" dirty="0" err="1" smtClean="0"/>
+                        <a:t>Подобряващ</a:t>
+                      </a:r>
+                      <a:r>
+                        <a:rPr lang="en-US" dirty="0" smtClean="0"/>
+                        <a:t>, </a:t>
+                      </a:r>
+                      <a:r>
+                        <a:rPr lang="en-US" dirty="0" err="1" smtClean="0"/>
+                        <a:t>уважава</a:t>
+                      </a:r>
+                      <a:r>
+                        <a:rPr lang="en-US" dirty="0" smtClean="0"/>
+                        <a:t> </a:t>
+                      </a:r>
+                      <a:r>
+                        <a:rPr lang="en-US" dirty="0" err="1" smtClean="0"/>
+                        <a:t>това</a:t>
+                      </a:r>
+                      <a:r>
+                        <a:rPr lang="en-US" dirty="0" smtClean="0"/>
+                        <a:t> </a:t>
+                      </a:r>
+                      <a:r>
+                        <a:rPr lang="en-US" dirty="0" err="1" smtClean="0"/>
+                        <a:t>което</a:t>
+                      </a:r>
+                      <a:r>
+                        <a:rPr lang="en-US" dirty="0" smtClean="0"/>
+                        <a:t> </a:t>
+                      </a:r>
+                      <a:r>
+                        <a:rPr lang="bg-BG" dirty="0" smtClean="0"/>
+                        <a:t>има</a:t>
+                      </a:r>
+                    </a:p>
+                    <a:p>
+                      <a:endParaRPr lang="bg-BG" dirty="0"/>
+                    </a:p>
+                  </a:txBody>
+                  <a:tcPr/>
+                </a:tc>
+                <a:tc>
+                  <a:txBody>
+                    <a:bodyPr/>
+                    <a:lstStyle/>
+                    <a:p>
+                      <a:pPr marL="0" marR="0" indent="0" algn="l" defTabSz="457200" rtl="0" eaLnBrk="1" fontAlgn="auto" latinLnBrk="0" hangingPunct="1">
+                        <a:lnSpc>
+                          <a:spcPct val="100000"/>
+                        </a:lnSpc>
+                        <a:spcBef>
+                          <a:spcPts val="0"/>
+                        </a:spcBef>
+                        <a:spcAft>
+                          <a:spcPts val="0"/>
+                        </a:spcAft>
+                        <a:buClrTx/>
+                        <a:buSzTx/>
+                        <a:buFontTx/>
+                        <a:buNone/>
+                        <a:tabLst/>
+                        <a:defRPr/>
+                      </a:pPr>
+                      <a:r>
+                        <a:rPr lang="en-US" dirty="0" err="1" smtClean="0"/>
+                        <a:t>Революционен</a:t>
+                      </a:r>
+                      <a:r>
+                        <a:rPr lang="en-US" dirty="0" smtClean="0"/>
+                        <a:t>, </a:t>
+                      </a:r>
+                      <a:r>
+                        <a:rPr lang="en-US" dirty="0" err="1" smtClean="0"/>
+                        <a:t>без</a:t>
+                      </a:r>
+                      <a:r>
+                        <a:rPr lang="en-US" dirty="0" smtClean="0"/>
+                        <a:t> </a:t>
+                      </a:r>
+                      <a:r>
+                        <a:rPr lang="en-US" dirty="0" err="1" smtClean="0"/>
+                        <a:t>значение</a:t>
+                      </a:r>
+                      <a:r>
+                        <a:rPr lang="en-US" dirty="0" smtClean="0"/>
+                        <a:t> </a:t>
+                      </a:r>
+                      <a:r>
+                        <a:rPr lang="en-US" dirty="0" err="1" smtClean="0"/>
+                        <a:t>какво</a:t>
+                      </a:r>
+                      <a:r>
+                        <a:rPr lang="en-US" dirty="0" smtClean="0"/>
+                        <a:t> е </a:t>
+                      </a:r>
+                      <a:r>
+                        <a:rPr lang="en-US" dirty="0" err="1" smtClean="0"/>
+                        <a:t>било</a:t>
+                      </a:r>
+                      <a:r>
+                        <a:rPr lang="en-US" dirty="0" smtClean="0"/>
+                        <a:t> </a:t>
+                      </a:r>
+                      <a:r>
+                        <a:rPr lang="en-US" dirty="0" err="1" smtClean="0"/>
+                        <a:t>преди</a:t>
+                      </a:r>
+                      <a:r>
+                        <a:rPr lang="en-US" dirty="0" smtClean="0"/>
+                        <a:t> </a:t>
+                      </a:r>
+                      <a:r>
+                        <a:rPr lang="en-US" dirty="0" err="1" smtClean="0"/>
+                        <a:t>това</a:t>
+                      </a:r>
+                      <a:endParaRPr lang="bg-BG" dirty="0" smtClean="0"/>
+                    </a:p>
+                    <a:p>
+                      <a:endParaRPr lang="bg-BG" dirty="0"/>
+                    </a:p>
+                  </a:txBody>
+                  <a:tcPr/>
+                </a:tc>
+              </a:tr>
+              <a:tr h="710214">
+                <a:tc>
+                  <a:txBody>
+                    <a:bodyPr/>
+                    <a:lstStyle/>
+                    <a:p>
+                      <a:pPr marL="0" marR="0" indent="0" algn="l" defTabSz="457200" rtl="0" eaLnBrk="1" fontAlgn="auto" latinLnBrk="0" hangingPunct="1">
+                        <a:lnSpc>
+                          <a:spcPct val="100000"/>
+                        </a:lnSpc>
+                        <a:spcBef>
+                          <a:spcPts val="0"/>
+                        </a:spcBef>
+                        <a:spcAft>
+                          <a:spcPts val="0"/>
+                        </a:spcAft>
+                        <a:buClrTx/>
+                        <a:buSzTx/>
+                        <a:buFontTx/>
+                        <a:buNone/>
+                        <a:tabLst/>
+                        <a:defRPr/>
+                      </a:pPr>
+                      <a:r>
+                        <a:rPr lang="bg-BG" dirty="0" smtClean="0"/>
+                        <a:t>Ограничава работата в процес </a:t>
+                      </a:r>
+                      <a:r>
+                        <a:rPr lang="en-US" dirty="0" smtClean="0"/>
+                        <a:t>и </a:t>
+                      </a:r>
+                      <a:r>
+                        <a:rPr lang="en-US" dirty="0" err="1" smtClean="0"/>
+                        <a:t>позволява</a:t>
+                      </a:r>
+                      <a:r>
+                        <a:rPr lang="en-US" dirty="0" smtClean="0"/>
+                        <a:t> </a:t>
+                      </a:r>
+                      <a:r>
+                        <a:rPr lang="en-US" dirty="0" err="1" smtClean="0"/>
+                        <a:t>времето</a:t>
+                      </a:r>
+                      <a:r>
+                        <a:rPr lang="en-US" dirty="0" smtClean="0"/>
+                        <a:t> </a:t>
+                      </a:r>
+                      <a:r>
+                        <a:rPr lang="en-US" dirty="0" err="1" smtClean="0"/>
+                        <a:t>да</a:t>
+                      </a:r>
+                      <a:r>
+                        <a:rPr lang="en-US" dirty="0" smtClean="0"/>
+                        <a:t> </a:t>
+                      </a:r>
+                      <a:r>
+                        <a:rPr lang="en-US" dirty="0" err="1" smtClean="0"/>
+                        <a:t>варира</a:t>
+                      </a:r>
+                      <a:endParaRPr lang="bg-BG" dirty="0" smtClean="0"/>
+                    </a:p>
+                    <a:p>
+                      <a:endParaRPr lang="bg-BG" dirty="0"/>
+                    </a:p>
+                  </a:txBody>
+                  <a:tcPr/>
+                </a:tc>
+                <a:tc>
+                  <a:txBody>
+                    <a:bodyPr/>
+                    <a:lstStyle/>
+                    <a:p>
+                      <a:pPr marL="0" marR="0" indent="0" algn="l" defTabSz="457200" rtl="0" eaLnBrk="1" fontAlgn="auto" latinLnBrk="0" hangingPunct="1">
+                        <a:lnSpc>
+                          <a:spcPct val="100000"/>
+                        </a:lnSpc>
+                        <a:spcBef>
+                          <a:spcPts val="0"/>
+                        </a:spcBef>
+                        <a:spcAft>
+                          <a:spcPts val="0"/>
+                        </a:spcAft>
+                        <a:buClrTx/>
+                        <a:buSzTx/>
+                        <a:buFontTx/>
+                        <a:buNone/>
+                        <a:tabLst/>
+                        <a:defRPr/>
+                      </a:pPr>
+                      <a:r>
+                        <a:rPr lang="en-US" dirty="0" smtClean="0"/>
+                        <a:t>WIP </a:t>
+                      </a:r>
+                      <a:r>
+                        <a:rPr lang="en-US" dirty="0" err="1" smtClean="0"/>
+                        <a:t>никога</a:t>
+                      </a:r>
+                      <a:r>
+                        <a:rPr lang="en-US" dirty="0" smtClean="0"/>
+                        <a:t> </a:t>
+                      </a:r>
+                      <a:r>
+                        <a:rPr lang="en-US" dirty="0" err="1" smtClean="0"/>
+                        <a:t>не</a:t>
+                      </a:r>
+                      <a:r>
+                        <a:rPr lang="en-US" dirty="0" smtClean="0"/>
+                        <a:t> </a:t>
+                      </a:r>
+                      <a:r>
+                        <a:rPr lang="en-US" dirty="0" err="1" smtClean="0"/>
+                        <a:t>надминава</a:t>
+                      </a:r>
+                      <a:r>
+                        <a:rPr lang="en-US" dirty="0" smtClean="0"/>
+                        <a:t> </a:t>
+                      </a:r>
+                      <a:r>
+                        <a:rPr lang="en-US" dirty="0" err="1" smtClean="0"/>
+                        <a:t>количеството</a:t>
+                      </a:r>
+                      <a:r>
+                        <a:rPr lang="bg-BG" dirty="0" smtClean="0"/>
+                        <a:t>,</a:t>
+                      </a:r>
+                      <a:r>
+                        <a:rPr lang="en-US" dirty="0" smtClean="0"/>
+                        <a:t> </a:t>
+                      </a:r>
+                      <a:r>
+                        <a:rPr lang="en-US" dirty="0" err="1" smtClean="0"/>
+                        <a:t>което</a:t>
+                      </a:r>
+                      <a:r>
+                        <a:rPr lang="en-US" dirty="0" smtClean="0"/>
+                        <a:t> </a:t>
+                      </a:r>
+                      <a:r>
+                        <a:rPr lang="en-US" dirty="0" err="1" smtClean="0"/>
+                        <a:t>може</a:t>
+                      </a:r>
+                      <a:r>
+                        <a:rPr lang="en-US" dirty="0" smtClean="0"/>
+                        <a:t> </a:t>
+                      </a:r>
+                      <a:r>
+                        <a:rPr lang="en-US" dirty="0" err="1" smtClean="0"/>
+                        <a:t>да</a:t>
+                      </a:r>
+                      <a:r>
+                        <a:rPr lang="en-US" dirty="0" smtClean="0"/>
+                        <a:t> </a:t>
+                      </a:r>
+                      <a:r>
+                        <a:rPr lang="en-US" dirty="0" err="1" smtClean="0"/>
+                        <a:t>бъде</a:t>
+                      </a:r>
+                      <a:r>
+                        <a:rPr lang="en-US" dirty="0" smtClean="0"/>
+                        <a:t> </a:t>
+                      </a:r>
+                      <a:r>
+                        <a:rPr lang="en-US" dirty="0" err="1" smtClean="0"/>
+                        <a:t>завършено</a:t>
+                      </a:r>
+                      <a:r>
+                        <a:rPr lang="en-US" dirty="0" smtClean="0"/>
+                        <a:t> </a:t>
+                      </a:r>
+                      <a:r>
+                        <a:rPr lang="en-US" dirty="0" err="1" smtClean="0"/>
+                        <a:t>от</a:t>
+                      </a:r>
+                      <a:r>
+                        <a:rPr lang="en-US" dirty="0" smtClean="0"/>
+                        <a:t> </a:t>
+                      </a:r>
+                      <a:r>
+                        <a:rPr lang="bg-BG" dirty="0" smtClean="0"/>
+                        <a:t>екипа</a:t>
+                      </a:r>
+                      <a:r>
+                        <a:rPr lang="en-US" dirty="0" smtClean="0"/>
+                        <a:t> в </a:t>
+                      </a:r>
+                      <a:r>
+                        <a:rPr lang="en-US" dirty="0" err="1" smtClean="0"/>
+                        <a:t>спринта</a:t>
+                      </a:r>
+                      <a:r>
+                        <a:rPr lang="en-US" dirty="0" smtClean="0"/>
+                        <a:t>. </a:t>
+                      </a:r>
+                      <a:r>
+                        <a:rPr lang="en-US" dirty="0" err="1" smtClean="0"/>
+                        <a:t>Ограничава</a:t>
+                      </a:r>
+                      <a:r>
+                        <a:rPr lang="en-US" dirty="0" smtClean="0"/>
+                        <a:t> </a:t>
+                      </a:r>
+                      <a:r>
+                        <a:rPr lang="en-US" dirty="0" err="1" smtClean="0"/>
+                        <a:t>времето</a:t>
+                      </a:r>
+                      <a:r>
+                        <a:rPr lang="en-US" dirty="0" smtClean="0"/>
+                        <a:t> и </a:t>
+                      </a:r>
+                      <a:r>
+                        <a:rPr lang="en-US" dirty="0" err="1" smtClean="0"/>
+                        <a:t>варира</a:t>
+                      </a:r>
+                      <a:r>
+                        <a:rPr lang="en-US" dirty="0" smtClean="0"/>
+                        <a:t> </a:t>
+                      </a:r>
+                      <a:r>
+                        <a:rPr lang="en-US" dirty="0" err="1" smtClean="0"/>
+                        <a:t>работата</a:t>
+                      </a:r>
+                      <a:r>
+                        <a:rPr lang="en-US" dirty="0" smtClean="0"/>
+                        <a:t> </a:t>
+                      </a:r>
+                      <a:r>
+                        <a:rPr lang="en-US" dirty="0" err="1" smtClean="0"/>
+                        <a:t>за</a:t>
+                      </a:r>
+                      <a:r>
+                        <a:rPr lang="en-US" dirty="0" smtClean="0"/>
+                        <a:t> </a:t>
+                      </a:r>
+                      <a:r>
+                        <a:rPr lang="en-US" dirty="0" err="1" smtClean="0"/>
+                        <a:t>да</a:t>
+                      </a:r>
+                      <a:r>
+                        <a:rPr lang="en-US" dirty="0" smtClean="0"/>
+                        <a:t> </a:t>
+                      </a:r>
+                      <a:r>
+                        <a:rPr lang="en-US" dirty="0" err="1" smtClean="0"/>
+                        <a:t>пасне</a:t>
+                      </a:r>
+                      <a:r>
+                        <a:rPr lang="en-US" dirty="0" smtClean="0"/>
+                        <a:t> </a:t>
+                      </a:r>
+                      <a:r>
+                        <a:rPr lang="en-US" dirty="0" err="1" smtClean="0"/>
+                        <a:t>във</a:t>
+                      </a:r>
+                      <a:r>
+                        <a:rPr lang="en-US" dirty="0" smtClean="0"/>
+                        <a:t> </a:t>
+                      </a:r>
+                      <a:r>
+                        <a:rPr lang="en-US" dirty="0" err="1" smtClean="0"/>
+                        <a:t>времето</a:t>
+                      </a:r>
+                      <a:endParaRPr lang="bg-BG" dirty="0" smtClean="0"/>
+                    </a:p>
+                    <a:p>
+                      <a:endParaRPr lang="bg-BG" dirty="0"/>
+                    </a:p>
+                  </a:txBody>
+                  <a:tcPr/>
+                </a:tc>
+              </a:tr>
+            </a:tbl>
+          </a:graphicData>
+        </a:graphic>
+      </p:graphicFrame>
+    </p:spTree>
+    <p:extLst>
+      <p:ext uri="{BB962C8B-B14F-4D97-AF65-F5344CB8AC3E}">
+        <p14:creationId xmlns:p14="http://schemas.microsoft.com/office/powerpoint/2010/main" val="908181204"/>
+      </p:ext>
+    </p:extLst>
+  </p:cSld>
+  <p:clrMapOvr>
+    <a:masterClrMapping/>
+  </p:clrMapOvr>
+</p:sld>
+</file>
+
+<file path=ppt/slides/slide27.xml><?xml version="1.0" encoding="utf-8"?>
+<p:sld xmlns:a="http://schemas.openxmlformats.org/drawingml/2006/main" xmlns:r="http://schemas.openxmlformats.org/officeDocument/2006/relationships" xmlns:p="http://schemas.openxmlformats.org/presentationml/2006/main">
+  <p:cSld>
+    <p:spTree>
+      <p:nvGrpSpPr>
+        <p:cNvPr id="1" name=""/>
+        <p:cNvGrpSpPr/>
+        <p:nvPr/>
+      </p:nvGrpSpPr>
+      <p:grpSpPr>
+        <a:xfrm>
+          <a:off x="0" y="0"/>
+          <a:ext cx="0" cy="0"/>
+          <a:chOff x="0" y="0"/>
+          <a:chExt cx="0" cy="0"/>
+        </a:xfrm>
+      </p:grpSpPr>
+      <p:sp>
+        <p:nvSpPr>
+          <p:cNvPr id="2" name="Title 1"/>
+          <p:cNvSpPr>
+            <a:spLocks noGrp="1"/>
+          </p:cNvSpPr>
+          <p:nvPr>
+            <p:ph type="title"/>
+          </p:nvPr>
+        </p:nvSpPr>
+        <p:spPr/>
+        <p:txBody>
+          <a:bodyPr/>
+          <a:lstStyle/>
+          <a:p>
+            <a:r>
+              <a:rPr lang="bg-BG" dirty="0" smtClean="0"/>
+              <a:t>За продуктова компания - </a:t>
+            </a:r>
+            <a:r>
+              <a:rPr lang="en-US" dirty="0" err="1" smtClean="0"/>
+              <a:t>Kanban</a:t>
+            </a:r>
+            <a:endParaRPr lang="bg-BG" dirty="0"/>
+          </a:p>
+        </p:txBody>
+      </p:sp>
+      <p:sp>
+        <p:nvSpPr>
+          <p:cNvPr id="3" name="Content Placeholder 2"/>
+          <p:cNvSpPr>
+            <a:spLocks noGrp="1"/>
+          </p:cNvSpPr>
+          <p:nvPr>
+            <p:ph sz="half" idx="1"/>
+          </p:nvPr>
+        </p:nvSpPr>
+        <p:spPr>
+          <a:xfrm>
+            <a:off x="677334" y="2160589"/>
+            <a:ext cx="7294814" cy="3880772"/>
+          </a:xfrm>
+        </p:spPr>
+        <p:txBody>
+          <a:bodyPr/>
+          <a:lstStyle/>
+          <a:p>
+            <a:r>
+              <a:rPr lang="bg-BG" dirty="0"/>
+              <a:t>П</a:t>
+            </a:r>
+            <a:r>
+              <a:rPr lang="en-US" dirty="0" err="1"/>
+              <a:t>одход</a:t>
+            </a:r>
+            <a:r>
+              <a:rPr lang="en-US" dirty="0"/>
+              <a:t> </a:t>
+            </a:r>
+            <a:r>
+              <a:rPr lang="en-US" dirty="0" err="1"/>
+              <a:t>за</a:t>
+            </a:r>
+            <a:r>
+              <a:rPr lang="en-US" dirty="0"/>
+              <a:t> </a:t>
+            </a:r>
+            <a:r>
+              <a:rPr lang="en-US" dirty="0" err="1"/>
+              <a:t>подобряване</a:t>
+            </a:r>
+            <a:r>
+              <a:rPr lang="en-US" dirty="0"/>
+              <a:t> </a:t>
+            </a:r>
+            <a:r>
+              <a:rPr lang="bg-BG" dirty="0" smtClean="0"/>
+              <a:t>, </a:t>
+            </a:r>
+            <a:r>
+              <a:rPr lang="en-US" dirty="0" err="1" smtClean="0"/>
+              <a:t>еволюционно</a:t>
+            </a:r>
+            <a:r>
+              <a:rPr lang="en-US" dirty="0" smtClean="0"/>
+              <a:t> </a:t>
+            </a:r>
+            <a:r>
+              <a:rPr lang="en-US" dirty="0" err="1" smtClean="0"/>
+              <a:t>усъвършенстване</a:t>
+            </a:r>
+            <a:endParaRPr lang="en-US" dirty="0" smtClean="0"/>
+          </a:p>
+          <a:p>
+            <a:r>
+              <a:rPr lang="bg-BG" dirty="0" smtClean="0"/>
+              <a:t>Зап</a:t>
+            </a:r>
+            <a:r>
+              <a:rPr lang="en-US" dirty="0" err="1" smtClean="0"/>
+              <a:t>очващ</a:t>
+            </a:r>
+            <a:r>
+              <a:rPr lang="en-US" dirty="0" smtClean="0"/>
+              <a:t> </a:t>
+            </a:r>
+            <a:r>
+              <a:rPr lang="en-US" dirty="0"/>
+              <a:t>с </a:t>
+            </a:r>
+            <a:r>
+              <a:rPr lang="en-US" dirty="0" err="1"/>
+              <a:t>каквото</a:t>
+            </a:r>
+            <a:r>
+              <a:rPr lang="en-US" dirty="0"/>
+              <a:t> </a:t>
+            </a:r>
+            <a:r>
+              <a:rPr lang="en-US" dirty="0" err="1"/>
+              <a:t>съществува</a:t>
+            </a:r>
+            <a:r>
+              <a:rPr lang="en-US" dirty="0"/>
+              <a:t> и </a:t>
+            </a:r>
+            <a:r>
+              <a:rPr lang="en-US" dirty="0" err="1" smtClean="0"/>
+              <a:t>итерира</a:t>
+            </a:r>
+            <a:endParaRPr lang="bg-BG" dirty="0" smtClean="0"/>
+          </a:p>
+          <a:p>
+            <a:r>
+              <a:rPr lang="bg-BG" dirty="0" smtClean="0"/>
+              <a:t>У</a:t>
+            </a:r>
+            <a:r>
+              <a:rPr lang="en-US" dirty="0" err="1" smtClean="0"/>
+              <a:t>важава</a:t>
+            </a:r>
+            <a:r>
+              <a:rPr lang="en-US" dirty="0" smtClean="0"/>
+              <a:t> </a:t>
+            </a:r>
+            <a:r>
+              <a:rPr lang="en-US" dirty="0" err="1"/>
+              <a:t>това</a:t>
+            </a:r>
+            <a:r>
+              <a:rPr lang="en-US" dirty="0"/>
+              <a:t> </a:t>
+            </a:r>
+            <a:r>
+              <a:rPr lang="en-US" dirty="0" err="1"/>
+              <a:t>което</a:t>
+            </a:r>
+            <a:r>
+              <a:rPr lang="en-US" dirty="0"/>
+              <a:t> </a:t>
+            </a:r>
+            <a:r>
+              <a:rPr lang="bg-BG" dirty="0" smtClean="0"/>
+              <a:t>има</a:t>
+            </a:r>
+          </a:p>
+        </p:txBody>
+      </p:sp>
+    </p:spTree>
+    <p:extLst>
+      <p:ext uri="{BB962C8B-B14F-4D97-AF65-F5344CB8AC3E}">
+        <p14:creationId xmlns:p14="http://schemas.microsoft.com/office/powerpoint/2010/main" val="2954705886"/>
+      </p:ext>
+    </p:extLst>
+  </p:cSld>
+  <p:clrMapOvr>
+    <a:masterClrMapping/>
+  </p:clrMapOvr>
+</p:sld>
+</file>
+
+<file path=ppt/slides/slide28.xml><?xml version="1.0" encoding="utf-8"?>
+<p:sld xmlns:a="http://schemas.openxmlformats.org/drawingml/2006/main" xmlns:r="http://schemas.openxmlformats.org/officeDocument/2006/relationships" xmlns:p="http://schemas.openxmlformats.org/presentationml/2006/main">
+  <p:cSld>
+    <p:spTree>
+      <p:nvGrpSpPr>
+        <p:cNvPr id="1" name=""/>
+        <p:cNvGrpSpPr/>
+        <p:nvPr/>
+      </p:nvGrpSpPr>
+      <p:grpSpPr>
+        <a:xfrm>
+          <a:off x="0" y="0"/>
+          <a:ext cx="0" cy="0"/>
+          <a:chOff x="0" y="0"/>
+          <a:chExt cx="0" cy="0"/>
+        </a:xfrm>
+      </p:grpSpPr>
+      <p:sp>
+        <p:nvSpPr>
+          <p:cNvPr id="2" name="Title 1"/>
+          <p:cNvSpPr>
+            <a:spLocks noGrp="1"/>
+          </p:cNvSpPr>
+          <p:nvPr>
+            <p:ph type="title"/>
+          </p:nvPr>
+        </p:nvSpPr>
+        <p:spPr>
+          <a:xfrm>
+            <a:off x="677334" y="896644"/>
+            <a:ext cx="8596668" cy="1033755"/>
+          </a:xfrm>
+        </p:spPr>
+        <p:txBody>
+          <a:bodyPr>
+            <a:normAutofit/>
+          </a:bodyPr>
+          <a:lstStyle/>
+          <a:p>
+            <a:pPr algn="ctr"/>
+            <a:r>
+              <a:rPr lang="bg-BG" sz="4800" dirty="0" smtClean="0"/>
+              <a:t>Въпроси ?</a:t>
+            </a:r>
+            <a:endParaRPr lang="bg-BG" sz="4800" dirty="0"/>
+          </a:p>
+        </p:txBody>
+      </p:sp>
+      <p:pic>
+        <p:nvPicPr>
+          <p:cNvPr id="5" name="Content Placeholder 4"/>
+          <p:cNvPicPr>
+            <a:picLocks noGrp="1" noChangeAspect="1"/>
+          </p:cNvPicPr>
+          <p:nvPr>
+            <p:ph sz="half" idx="1"/>
+          </p:nvPr>
+        </p:nvPicPr>
+        <p:blipFill>
+          <a:blip r:embed="rId2">
+            <a:extLst>
+              <a:ext uri="{28A0092B-C50C-407E-A947-70E740481C1C}">
+                <a14:useLocalDpi xmlns:a14="http://schemas.microsoft.com/office/drawing/2010/main" val="0"/>
+              </a:ext>
+            </a:extLst>
+          </a:blip>
+          <a:stretch>
+            <a:fillRect/>
+          </a:stretch>
+        </p:blipFill>
+        <p:spPr>
+          <a:xfrm>
+            <a:off x="3090069" y="2160588"/>
+            <a:ext cx="3881437" cy="3881437"/>
+          </a:xfrm>
+        </p:spPr>
+      </p:pic>
+    </p:spTree>
+    <p:extLst>
+      <p:ext uri="{BB962C8B-B14F-4D97-AF65-F5344CB8AC3E}">
+        <p14:creationId xmlns:p14="http://schemas.microsoft.com/office/powerpoint/2010/main" val="2393166605"/>
+      </p:ext>
+    </p:extLst>
+  </p:cSld>
+  <p:clrMapOvr>
+    <a:masterClrMapping/>
+  </p:clrMapOvr>
 </p:sld>
 </file>
 
@@ -8637,7 +10023,7 @@
     </a:clrScheme>
     <a:fontScheme name="Facet">
       <a:majorFont>
-        <a:latin typeface="Trebuchet MS" panose="020B0603020202020204"/>
+        <a:latin typeface="Trebuchet MS"/>
         <a:ea typeface=""/>
         <a:cs typeface=""/>
         <a:font script="Jpan" typeface="メイリオ"/>
@@ -8672,7 +10058,7 @@
         <a:font script="Geor" typeface="Sylfaen"/>
       </a:majorFont>
       <a:minorFont>
-        <a:latin typeface="Trebuchet MS" panose="020B0603020202020204"/>
+        <a:latin typeface="Trebuchet MS"/>
         <a:ea typeface=""/>
         <a:cs typeface=""/>
         <a:font script="Jpan" typeface="メイリオ"/>
@@ -8845,7 +10231,7 @@
   <a:extraClrSchemeLst/>
   <a:extLst>
     <a:ext uri="{05A4C25C-085E-4340-85A3-A5531E510DB2}">
-      <thm15:themeFamily xmlns:thm15="http://schemas.microsoft.com/office/thememl/2012/main" name="Facet" id="{C0C680CD-088A-49FC-A102-D699147F32B2}" vid="{0B5AB586-D108-4FC1-8368-649FE654B894}"/>
+      <thm15:themeFamily xmlns:thm15="http://schemas.microsoft.com/office/thememl/2012/main" xmlns="" name="Facet" id="{C0C680CD-088A-49FC-A102-D699147F32B2}" vid="{0B5AB586-D108-4FC1-8368-649FE654B894}"/>
     </a:ext>
   </a:extLst>
 </a:theme>

</xml_diff>